<commit_message>
Did an edit pass.
</commit_message>
<xml_diff>
--- a/source/images/bitsback.pptx
+++ b/source/images/bitsback.pptx
@@ -109,6 +109,11 @@
       </a:defRPr>
     </a:lvl9pPr>
   </p:defaultTextStyle>
+  <p:extLst>
+    <p:ext uri="{EFAFB233-063F-42B5-8137-9DF3F51BA10A}">
+      <p15:sldGuideLst xmlns:p15="http://schemas.microsoft.com/office/powerpoint/2012/main"/>
+    </p:ext>
+  </p:extLst>
 </p:presentation>
 </file>
 
@@ -243,7 +248,7 @@
           <a:p>
             <a:fld id="{3DC071CE-3C1B-8649-A972-7C93A74402A2}" type="datetimeFigureOut">
               <a:rPr lang="en-US" smtClean="0"/>
-              <a:t>6/24/21</a:t>
+              <a:t>7/7/21</a:t>
             </a:fld>
             <a:endParaRPr lang="en-US"/>
           </a:p>
@@ -413,7 +418,7 @@
           <a:p>
             <a:fld id="{3DC071CE-3C1B-8649-A972-7C93A74402A2}" type="datetimeFigureOut">
               <a:rPr lang="en-US" smtClean="0"/>
-              <a:t>6/24/21</a:t>
+              <a:t>7/7/21</a:t>
             </a:fld>
             <a:endParaRPr lang="en-US"/>
           </a:p>
@@ -593,7 +598,7 @@
           <a:p>
             <a:fld id="{3DC071CE-3C1B-8649-A972-7C93A74402A2}" type="datetimeFigureOut">
               <a:rPr lang="en-US" smtClean="0"/>
-              <a:t>6/24/21</a:t>
+              <a:t>7/7/21</a:t>
             </a:fld>
             <a:endParaRPr lang="en-US"/>
           </a:p>
@@ -763,7 +768,7 @@
           <a:p>
             <a:fld id="{3DC071CE-3C1B-8649-A972-7C93A74402A2}" type="datetimeFigureOut">
               <a:rPr lang="en-US" smtClean="0"/>
-              <a:t>6/24/21</a:t>
+              <a:t>7/7/21</a:t>
             </a:fld>
             <a:endParaRPr lang="en-US"/>
           </a:p>
@@ -1007,7 +1012,7 @@
           <a:p>
             <a:fld id="{3DC071CE-3C1B-8649-A972-7C93A74402A2}" type="datetimeFigureOut">
               <a:rPr lang="en-US" smtClean="0"/>
-              <a:t>6/24/21</a:t>
+              <a:t>7/7/21</a:t>
             </a:fld>
             <a:endParaRPr lang="en-US"/>
           </a:p>
@@ -1239,7 +1244,7 @@
           <a:p>
             <a:fld id="{3DC071CE-3C1B-8649-A972-7C93A74402A2}" type="datetimeFigureOut">
               <a:rPr lang="en-US" smtClean="0"/>
-              <a:t>6/24/21</a:t>
+              <a:t>7/7/21</a:t>
             </a:fld>
             <a:endParaRPr lang="en-US"/>
           </a:p>
@@ -1606,7 +1611,7 @@
           <a:p>
             <a:fld id="{3DC071CE-3C1B-8649-A972-7C93A74402A2}" type="datetimeFigureOut">
               <a:rPr lang="en-US" smtClean="0"/>
-              <a:t>6/24/21</a:t>
+              <a:t>7/7/21</a:t>
             </a:fld>
             <a:endParaRPr lang="en-US"/>
           </a:p>
@@ -1724,7 +1729,7 @@
           <a:p>
             <a:fld id="{3DC071CE-3C1B-8649-A972-7C93A74402A2}" type="datetimeFigureOut">
               <a:rPr lang="en-US" smtClean="0"/>
-              <a:t>6/24/21</a:t>
+              <a:t>7/7/21</a:t>
             </a:fld>
             <a:endParaRPr lang="en-US"/>
           </a:p>
@@ -1819,7 +1824,7 @@
           <a:p>
             <a:fld id="{3DC071CE-3C1B-8649-A972-7C93A74402A2}" type="datetimeFigureOut">
               <a:rPr lang="en-US" smtClean="0"/>
-              <a:t>6/24/21</a:t>
+              <a:t>7/7/21</a:t>
             </a:fld>
             <a:endParaRPr lang="en-US"/>
           </a:p>
@@ -2096,7 +2101,7 @@
           <a:p>
             <a:fld id="{3DC071CE-3C1B-8649-A972-7C93A74402A2}" type="datetimeFigureOut">
               <a:rPr lang="en-US" smtClean="0"/>
-              <a:t>6/24/21</a:t>
+              <a:t>7/7/21</a:t>
             </a:fld>
             <a:endParaRPr lang="en-US"/>
           </a:p>
@@ -2353,7 +2358,7 @@
           <a:p>
             <a:fld id="{3DC071CE-3C1B-8649-A972-7C93A74402A2}" type="datetimeFigureOut">
               <a:rPr lang="en-US" smtClean="0"/>
-              <a:t>6/24/21</a:t>
+              <a:t>7/7/21</a:t>
             </a:fld>
             <a:endParaRPr lang="en-US"/>
           </a:p>
@@ -2566,7 +2571,7 @@
           <a:p>
             <a:fld id="{3DC071CE-3C1B-8649-A972-7C93A74402A2}" type="datetimeFigureOut">
               <a:rPr lang="en-US" smtClean="0"/>
-              <a:t>6/24/21</a:t>
+              <a:t>7/7/21</a:t>
             </a:fld>
             <a:endParaRPr lang="en-US"/>
           </a:p>
@@ -2971,8 +2976,8 @@
           <a:chExt cx="0" cy="0"/>
         </a:xfrm>
       </p:grpSpPr>
-      <mc:AlternateContent xmlns:mc="http://schemas.openxmlformats.org/markup-compatibility/2006">
-        <mc:Choice xmlns:a14="http://schemas.microsoft.com/office/drawing/2010/main" Requires="a14">
+      <mc:AlternateContent xmlns:mc="http://schemas.openxmlformats.org/markup-compatibility/2006" xmlns:a14="http://schemas.microsoft.com/office/drawing/2010/main">
+        <mc:Choice Requires="a14">
           <p:sp>
             <p:nvSpPr>
               <p:cNvPr id="9" name="Rectangle 8">
@@ -3073,7 +3078,7 @@
             </p:txBody>
           </p:sp>
         </mc:Choice>
-        <mc:Fallback>
+        <mc:Fallback xmlns="">
           <p:sp>
             <p:nvSpPr>
               <p:cNvPr id="9" name="Rectangle 8">
@@ -3123,8 +3128,8 @@
           </p:sp>
         </mc:Fallback>
       </mc:AlternateContent>
-      <mc:AlternateContent xmlns:mc="http://schemas.openxmlformats.org/markup-compatibility/2006">
-        <mc:Choice xmlns:a14="http://schemas.microsoft.com/office/drawing/2010/main" Requires="a14">
+      <mc:AlternateContent xmlns:mc="http://schemas.openxmlformats.org/markup-compatibility/2006" xmlns:a14="http://schemas.microsoft.com/office/drawing/2010/main">
+        <mc:Choice Requires="a14">
           <p:sp>
             <p:nvSpPr>
               <p:cNvPr id="10" name="Rectangle 9">
@@ -3225,7 +3230,7 @@
             </p:txBody>
           </p:sp>
         </mc:Choice>
-        <mc:Fallback>
+        <mc:Fallback xmlns="">
           <p:sp>
             <p:nvSpPr>
               <p:cNvPr id="10" name="Rectangle 9">
@@ -3275,8 +3280,8 @@
           </p:sp>
         </mc:Fallback>
       </mc:AlternateContent>
-      <mc:AlternateContent xmlns:mc="http://schemas.openxmlformats.org/markup-compatibility/2006">
-        <mc:Choice xmlns:a14="http://schemas.microsoft.com/office/drawing/2010/main" Requires="a14">
+      <mc:AlternateContent xmlns:mc="http://schemas.openxmlformats.org/markup-compatibility/2006" xmlns:a14="http://schemas.microsoft.com/office/drawing/2010/main">
+        <mc:Choice Requires="a14">
           <p:sp>
             <p:nvSpPr>
               <p:cNvPr id="11" name="Rectangle 10">
@@ -3356,7 +3361,7 @@
             </p:txBody>
           </p:sp>
         </mc:Choice>
-        <mc:Fallback>
+        <mc:Fallback xmlns="">
           <p:sp>
             <p:nvSpPr>
               <p:cNvPr id="11" name="Rectangle 10">
@@ -3406,8 +3411,8 @@
           </p:sp>
         </mc:Fallback>
       </mc:AlternateContent>
-      <mc:AlternateContent xmlns:mc="http://schemas.openxmlformats.org/markup-compatibility/2006">
-        <mc:Choice xmlns:a14="http://schemas.microsoft.com/office/drawing/2010/main" Requires="a14">
+      <mc:AlternateContent xmlns:mc="http://schemas.openxmlformats.org/markup-compatibility/2006" xmlns:a14="http://schemas.microsoft.com/office/drawing/2010/main">
+        <mc:Choice Requires="a14">
           <p:sp>
             <p:nvSpPr>
               <p:cNvPr id="12" name="Rectangle 11">
@@ -3517,7 +3522,7 @@
             </p:txBody>
           </p:sp>
         </mc:Choice>
-        <mc:Fallback>
+        <mc:Fallback xmlns="">
           <p:sp>
             <p:nvSpPr>
               <p:cNvPr id="12" name="Rectangle 11">
@@ -3567,8 +3572,8 @@
           </p:sp>
         </mc:Fallback>
       </mc:AlternateContent>
-      <mc:AlternateContent xmlns:mc="http://schemas.openxmlformats.org/markup-compatibility/2006">
-        <mc:Choice xmlns:a14="http://schemas.microsoft.com/office/drawing/2010/main" Requires="a14">
+      <mc:AlternateContent xmlns:mc="http://schemas.openxmlformats.org/markup-compatibility/2006" xmlns:a14="http://schemas.microsoft.com/office/drawing/2010/main">
+        <mc:Choice Requires="a14">
           <p:sp>
             <p:nvSpPr>
               <p:cNvPr id="13" name="Rectangle 12">
@@ -3669,7 +3674,7 @@
             </p:txBody>
           </p:sp>
         </mc:Choice>
-        <mc:Fallback>
+        <mc:Fallback xmlns="">
           <p:sp>
             <p:nvSpPr>
               <p:cNvPr id="13" name="Rectangle 12">
@@ -4033,8 +4038,8 @@
           </a:p>
         </p:txBody>
       </p:sp>
-      <mc:AlternateContent xmlns:mc="http://schemas.openxmlformats.org/markup-compatibility/2006">
-        <mc:Choice xmlns:a14="http://schemas.microsoft.com/office/drawing/2010/main" Requires="a14">
+      <mc:AlternateContent xmlns:mc="http://schemas.openxmlformats.org/markup-compatibility/2006" xmlns:a14="http://schemas.microsoft.com/office/drawing/2010/main">
+        <mc:Choice Requires="a14">
           <p:sp>
             <p:nvSpPr>
               <p:cNvPr id="34" name="Rectangle 33">
@@ -4113,7 +4118,7 @@
             </p:txBody>
           </p:sp>
         </mc:Choice>
-        <mc:Fallback>
+        <mc:Fallback xmlns="">
           <p:sp>
             <p:nvSpPr>
               <p:cNvPr id="34" name="Rectangle 33">
@@ -4671,8 +4676,8 @@
           </a:fontRef>
         </p:style>
       </p:cxnSp>
-      <mc:AlternateContent xmlns:mc="http://schemas.openxmlformats.org/markup-compatibility/2006">
-        <mc:Choice xmlns:a14="http://schemas.microsoft.com/office/drawing/2010/main" Requires="a14">
+      <mc:AlternateContent xmlns:mc="http://schemas.openxmlformats.org/markup-compatibility/2006" xmlns:a14="http://schemas.microsoft.com/office/drawing/2010/main">
+        <mc:Choice Requires="a14">
           <p:sp>
             <p:nvSpPr>
               <p:cNvPr id="108" name="Rectangle 107">
@@ -4774,7 +4779,7 @@
             </p:txBody>
           </p:sp>
         </mc:Choice>
-        <mc:Fallback>
+        <mc:Fallback xmlns="">
           <p:sp>
             <p:nvSpPr>
               <p:cNvPr id="108" name="Rectangle 107">
@@ -4824,8 +4829,8 @@
           </p:sp>
         </mc:Fallback>
       </mc:AlternateContent>
-      <mc:AlternateContent xmlns:mc="http://schemas.openxmlformats.org/markup-compatibility/2006">
-        <mc:Choice xmlns:a14="http://schemas.microsoft.com/office/drawing/2010/main" Requires="a14">
+      <mc:AlternateContent xmlns:mc="http://schemas.openxmlformats.org/markup-compatibility/2006" xmlns:a14="http://schemas.microsoft.com/office/drawing/2010/main">
+        <mc:Choice Requires="a14">
           <p:sp>
             <p:nvSpPr>
               <p:cNvPr id="109" name="Rectangle 108">
@@ -4927,7 +4932,7 @@
             </p:txBody>
           </p:sp>
         </mc:Choice>
-        <mc:Fallback>
+        <mc:Fallback xmlns="">
           <p:sp>
             <p:nvSpPr>
               <p:cNvPr id="109" name="Rectangle 108">
@@ -4977,8 +4982,8 @@
           </p:sp>
         </mc:Fallback>
       </mc:AlternateContent>
-      <mc:AlternateContent xmlns:mc="http://schemas.openxmlformats.org/markup-compatibility/2006">
-        <mc:Choice xmlns:a14="http://schemas.microsoft.com/office/drawing/2010/main" Requires="a14">
+      <mc:AlternateContent xmlns:mc="http://schemas.openxmlformats.org/markup-compatibility/2006" xmlns:a14="http://schemas.microsoft.com/office/drawing/2010/main">
+        <mc:Choice Requires="a14">
           <p:sp>
             <p:nvSpPr>
               <p:cNvPr id="110" name="Rectangle 109">
@@ -5059,7 +5064,7 @@
             </p:txBody>
           </p:sp>
         </mc:Choice>
-        <mc:Fallback>
+        <mc:Fallback xmlns="">
           <p:sp>
             <p:nvSpPr>
               <p:cNvPr id="110" name="Rectangle 109">
@@ -5109,8 +5114,8 @@
           </p:sp>
         </mc:Fallback>
       </mc:AlternateContent>
-      <mc:AlternateContent xmlns:mc="http://schemas.openxmlformats.org/markup-compatibility/2006">
-        <mc:Choice xmlns:a14="http://schemas.microsoft.com/office/drawing/2010/main" Requires="a14">
+      <mc:AlternateContent xmlns:mc="http://schemas.openxmlformats.org/markup-compatibility/2006" xmlns:a14="http://schemas.microsoft.com/office/drawing/2010/main">
+        <mc:Choice Requires="a14">
           <p:sp>
             <p:nvSpPr>
               <p:cNvPr id="111" name="Rectangle 110">
@@ -5220,7 +5225,7 @@
             </p:txBody>
           </p:sp>
         </mc:Choice>
-        <mc:Fallback>
+        <mc:Fallback xmlns="">
           <p:sp>
             <p:nvSpPr>
               <p:cNvPr id="111" name="Rectangle 110">
@@ -5270,8 +5275,8 @@
           </p:sp>
         </mc:Fallback>
       </mc:AlternateContent>
-      <mc:AlternateContent xmlns:mc="http://schemas.openxmlformats.org/markup-compatibility/2006">
-        <mc:Choice xmlns:a14="http://schemas.microsoft.com/office/drawing/2010/main" Requires="a14">
+      <mc:AlternateContent xmlns:mc="http://schemas.openxmlformats.org/markup-compatibility/2006" xmlns:a14="http://schemas.microsoft.com/office/drawing/2010/main">
+        <mc:Choice Requires="a14">
           <p:sp>
             <p:nvSpPr>
               <p:cNvPr id="112" name="Rectangle 111">
@@ -5372,7 +5377,7 @@
             </p:txBody>
           </p:sp>
         </mc:Choice>
-        <mc:Fallback>
+        <mc:Fallback xmlns="">
           <p:sp>
             <p:nvSpPr>
               <p:cNvPr id="112" name="Rectangle 111">
@@ -5629,8 +5634,8 @@
           </a:fontRef>
         </p:style>
       </p:cxnSp>
-      <mc:AlternateContent xmlns:mc="http://schemas.openxmlformats.org/markup-compatibility/2006">
-        <mc:Choice xmlns:a14="http://schemas.microsoft.com/office/drawing/2010/main" Requires="a14">
+      <mc:AlternateContent xmlns:mc="http://schemas.openxmlformats.org/markup-compatibility/2006" xmlns:a14="http://schemas.microsoft.com/office/drawing/2010/main">
+        <mc:Choice Requires="a14">
           <p:sp>
             <p:nvSpPr>
               <p:cNvPr id="1059" name="TextBox 1058">
@@ -5659,6 +5664,7 @@
               </a:bodyPr>
               <a:lstStyle/>
               <a:p>
+                <a:pPr/>
                 <a14:m>
                   <m:oMathPara xmlns:m="http://schemas.openxmlformats.org/officeDocument/2006/math">
                     <m:oMathParaPr>
@@ -5704,7 +5710,7 @@
             </p:txBody>
           </p:sp>
         </mc:Choice>
-        <mc:Fallback>
+        <mc:Fallback xmlns="">
           <p:sp>
             <p:nvSpPr>
               <p:cNvPr id="1059" name="TextBox 1058">
@@ -5797,8 +5803,8 @@
           </a:fontRef>
         </p:style>
       </p:cxnSp>
-      <mc:AlternateContent xmlns:mc="http://schemas.openxmlformats.org/markup-compatibility/2006">
-        <mc:Choice xmlns:a14="http://schemas.microsoft.com/office/drawing/2010/main" Requires="a14">
+      <mc:AlternateContent xmlns:mc="http://schemas.openxmlformats.org/markup-compatibility/2006" xmlns:a14="http://schemas.microsoft.com/office/drawing/2010/main">
+        <mc:Choice Requires="a14">
           <p:sp>
             <p:nvSpPr>
               <p:cNvPr id="151" name="TextBox 150">
@@ -5827,6 +5833,7 @@
               </a:bodyPr>
               <a:lstStyle/>
               <a:p>
+                <a:pPr/>
                 <a14:m>
                   <m:oMathPara xmlns:m="http://schemas.openxmlformats.org/officeDocument/2006/math">
                     <m:oMathParaPr>
@@ -5865,7 +5872,7 @@
             </p:txBody>
           </p:sp>
         </mc:Choice>
-        <mc:Fallback>
+        <mc:Fallback xmlns="">
           <p:sp>
             <p:nvSpPr>
               <p:cNvPr id="151" name="TextBox 150">
@@ -5910,8 +5917,8 @@
           </p:sp>
         </mc:Fallback>
       </mc:AlternateContent>
-      <mc:AlternateContent xmlns:mc="http://schemas.openxmlformats.org/markup-compatibility/2006">
-        <mc:Choice xmlns:a14="http://schemas.microsoft.com/office/drawing/2010/main" Requires="a14">
+      <mc:AlternateContent xmlns:mc="http://schemas.openxmlformats.org/markup-compatibility/2006" xmlns:a14="http://schemas.microsoft.com/office/drawing/2010/main">
+        <mc:Choice Requires="a14">
           <p:sp>
             <p:nvSpPr>
               <p:cNvPr id="152" name="TextBox 151">
@@ -5940,6 +5947,7 @@
               </a:bodyPr>
               <a:lstStyle/>
               <a:p>
+                <a:pPr/>
                 <a14:m>
                   <m:oMathPara xmlns:m="http://schemas.openxmlformats.org/officeDocument/2006/math">
                     <m:oMathParaPr>
@@ -5997,7 +6005,7 @@
             </p:txBody>
           </p:sp>
         </mc:Choice>
-        <mc:Fallback>
+        <mc:Fallback xmlns="">
           <p:sp>
             <p:nvSpPr>
               <p:cNvPr id="152" name="TextBox 151">
@@ -6088,8 +6096,8 @@
           </a:fontRef>
         </p:style>
       </p:cxnSp>
-      <mc:AlternateContent xmlns:mc="http://schemas.openxmlformats.org/markup-compatibility/2006">
-        <mc:Choice xmlns:a14="http://schemas.microsoft.com/office/drawing/2010/main" Requires="a14">
+      <mc:AlternateContent xmlns:mc="http://schemas.openxmlformats.org/markup-compatibility/2006" xmlns:a14="http://schemas.microsoft.com/office/drawing/2010/main">
+        <mc:Choice Requires="a14">
           <p:sp>
             <p:nvSpPr>
               <p:cNvPr id="164" name="Rectangle 163">
@@ -6190,7 +6198,7 @@
             </p:txBody>
           </p:sp>
         </mc:Choice>
-        <mc:Fallback>
+        <mc:Fallback xmlns="">
           <p:sp>
             <p:nvSpPr>
               <p:cNvPr id="164" name="Rectangle 163">
@@ -6240,8 +6248,8 @@
           </p:sp>
         </mc:Fallback>
       </mc:AlternateContent>
-      <mc:AlternateContent xmlns:mc="http://schemas.openxmlformats.org/markup-compatibility/2006">
-        <mc:Choice xmlns:a14="http://schemas.microsoft.com/office/drawing/2010/main" Requires="a14">
+      <mc:AlternateContent xmlns:mc="http://schemas.openxmlformats.org/markup-compatibility/2006" xmlns:a14="http://schemas.microsoft.com/office/drawing/2010/main">
+        <mc:Choice Requires="a14">
           <p:sp>
             <p:nvSpPr>
               <p:cNvPr id="165" name="Rectangle 164">
@@ -6342,7 +6350,7 @@
             </p:txBody>
           </p:sp>
         </mc:Choice>
-        <mc:Fallback>
+        <mc:Fallback xmlns="">
           <p:sp>
             <p:nvSpPr>
               <p:cNvPr id="165" name="Rectangle 164">
@@ -6392,8 +6400,8 @@
           </p:sp>
         </mc:Fallback>
       </mc:AlternateContent>
-      <mc:AlternateContent xmlns:mc="http://schemas.openxmlformats.org/markup-compatibility/2006">
-        <mc:Choice xmlns:a14="http://schemas.microsoft.com/office/drawing/2010/main" Requires="a14">
+      <mc:AlternateContent xmlns:mc="http://schemas.openxmlformats.org/markup-compatibility/2006" xmlns:a14="http://schemas.microsoft.com/office/drawing/2010/main">
+        <mc:Choice Requires="a14">
           <p:sp>
             <p:nvSpPr>
               <p:cNvPr id="166" name="Rectangle 165">
@@ -6473,7 +6481,7 @@
             </p:txBody>
           </p:sp>
         </mc:Choice>
-        <mc:Fallback>
+        <mc:Fallback xmlns="">
           <p:sp>
             <p:nvSpPr>
               <p:cNvPr id="166" name="Rectangle 165">
@@ -6523,8 +6531,8 @@
           </p:sp>
         </mc:Fallback>
       </mc:AlternateContent>
-      <mc:AlternateContent xmlns:mc="http://schemas.openxmlformats.org/markup-compatibility/2006">
-        <mc:Choice xmlns:a14="http://schemas.microsoft.com/office/drawing/2010/main" Requires="a14">
+      <mc:AlternateContent xmlns:mc="http://schemas.openxmlformats.org/markup-compatibility/2006" xmlns:a14="http://schemas.microsoft.com/office/drawing/2010/main">
+        <mc:Choice Requires="a14">
           <p:sp>
             <p:nvSpPr>
               <p:cNvPr id="167" name="Rectangle 166">
@@ -6634,7 +6642,7 @@
             </p:txBody>
           </p:sp>
         </mc:Choice>
-        <mc:Fallback>
+        <mc:Fallback xmlns="">
           <p:sp>
             <p:nvSpPr>
               <p:cNvPr id="167" name="Rectangle 166">
@@ -6684,8 +6692,8 @@
           </p:sp>
         </mc:Fallback>
       </mc:AlternateContent>
-      <mc:AlternateContent xmlns:mc="http://schemas.openxmlformats.org/markup-compatibility/2006">
-        <mc:Choice xmlns:a14="http://schemas.microsoft.com/office/drawing/2010/main" Requires="a14">
+      <mc:AlternateContent xmlns:mc="http://schemas.openxmlformats.org/markup-compatibility/2006" xmlns:a14="http://schemas.microsoft.com/office/drawing/2010/main">
+        <mc:Choice Requires="a14">
           <p:sp>
             <p:nvSpPr>
               <p:cNvPr id="168" name="Rectangle 167">
@@ -6786,7 +6794,7 @@
             </p:txBody>
           </p:sp>
         </mc:Choice>
-        <mc:Fallback>
+        <mc:Fallback xmlns="">
           <p:sp>
             <p:nvSpPr>
               <p:cNvPr id="168" name="Rectangle 167">
@@ -6925,8 +6933,8 @@
           </a:solidFill>
         </p:spPr>
       </p:pic>
-      <mc:AlternateContent xmlns:mc="http://schemas.openxmlformats.org/markup-compatibility/2006">
-        <mc:Choice xmlns:a14="http://schemas.microsoft.com/office/drawing/2010/main" Requires="a14">
+      <mc:AlternateContent xmlns:mc="http://schemas.openxmlformats.org/markup-compatibility/2006" xmlns:a14="http://schemas.microsoft.com/office/drawing/2010/main">
+        <mc:Choice Requires="a14">
           <p:sp>
             <p:nvSpPr>
               <p:cNvPr id="181" name="Rectangle 180">
@@ -7028,7 +7036,7 @@
             </p:txBody>
           </p:sp>
         </mc:Choice>
-        <mc:Fallback>
+        <mc:Fallback xmlns="">
           <p:sp>
             <p:nvSpPr>
               <p:cNvPr id="181" name="Rectangle 180">
@@ -7078,8 +7086,8 @@
           </p:sp>
         </mc:Fallback>
       </mc:AlternateContent>
-      <mc:AlternateContent xmlns:mc="http://schemas.openxmlformats.org/markup-compatibility/2006">
-        <mc:Choice xmlns:a14="http://schemas.microsoft.com/office/drawing/2010/main" Requires="a14">
+      <mc:AlternateContent xmlns:mc="http://schemas.openxmlformats.org/markup-compatibility/2006" xmlns:a14="http://schemas.microsoft.com/office/drawing/2010/main">
+        <mc:Choice Requires="a14">
           <p:sp>
             <p:nvSpPr>
               <p:cNvPr id="182" name="Rectangle 181">
@@ -7181,7 +7189,7 @@
             </p:txBody>
           </p:sp>
         </mc:Choice>
-        <mc:Fallback>
+        <mc:Fallback xmlns="">
           <p:sp>
             <p:nvSpPr>
               <p:cNvPr id="182" name="Rectangle 181">
@@ -7231,8 +7239,8 @@
           </p:sp>
         </mc:Fallback>
       </mc:AlternateContent>
-      <mc:AlternateContent xmlns:mc="http://schemas.openxmlformats.org/markup-compatibility/2006">
-        <mc:Choice xmlns:a14="http://schemas.microsoft.com/office/drawing/2010/main" Requires="a14">
+      <mc:AlternateContent xmlns:mc="http://schemas.openxmlformats.org/markup-compatibility/2006" xmlns:a14="http://schemas.microsoft.com/office/drawing/2010/main">
+        <mc:Choice Requires="a14">
           <p:sp>
             <p:nvSpPr>
               <p:cNvPr id="183" name="Rectangle 182">
@@ -7313,7 +7321,7 @@
             </p:txBody>
           </p:sp>
         </mc:Choice>
-        <mc:Fallback>
+        <mc:Fallback xmlns="">
           <p:sp>
             <p:nvSpPr>
               <p:cNvPr id="183" name="Rectangle 182">
@@ -7363,8 +7371,8 @@
           </p:sp>
         </mc:Fallback>
       </mc:AlternateContent>
-      <mc:AlternateContent xmlns:mc="http://schemas.openxmlformats.org/markup-compatibility/2006">
-        <mc:Choice xmlns:a14="http://schemas.microsoft.com/office/drawing/2010/main" Requires="a14">
+      <mc:AlternateContent xmlns:mc="http://schemas.openxmlformats.org/markup-compatibility/2006" xmlns:a14="http://schemas.microsoft.com/office/drawing/2010/main">
+        <mc:Choice Requires="a14">
           <p:sp>
             <p:nvSpPr>
               <p:cNvPr id="184" name="Rectangle 183">
@@ -7474,7 +7482,7 @@
             </p:txBody>
           </p:sp>
         </mc:Choice>
-        <mc:Fallback>
+        <mc:Fallback xmlns="">
           <p:sp>
             <p:nvSpPr>
               <p:cNvPr id="184" name="Rectangle 183">
@@ -7524,8 +7532,8 @@
           </p:sp>
         </mc:Fallback>
       </mc:AlternateContent>
-      <mc:AlternateContent xmlns:mc="http://schemas.openxmlformats.org/markup-compatibility/2006">
-        <mc:Choice xmlns:a14="http://schemas.microsoft.com/office/drawing/2010/main" Requires="a14">
+      <mc:AlternateContent xmlns:mc="http://schemas.openxmlformats.org/markup-compatibility/2006" xmlns:a14="http://schemas.microsoft.com/office/drawing/2010/main">
+        <mc:Choice Requires="a14">
           <p:sp>
             <p:nvSpPr>
               <p:cNvPr id="185" name="Rectangle 184">
@@ -7626,7 +7634,7 @@
             </p:txBody>
           </p:sp>
         </mc:Choice>
-        <mc:Fallback>
+        <mc:Fallback xmlns="">
           <p:sp>
             <p:nvSpPr>
               <p:cNvPr id="185" name="Rectangle 184">
@@ -8168,8 +8176,8 @@
           </a:p>
         </p:txBody>
       </p:sp>
-      <mc:AlternateContent xmlns:mc="http://schemas.openxmlformats.org/markup-compatibility/2006">
-        <mc:Choice xmlns:a14="http://schemas.microsoft.com/office/drawing/2010/main" Requires="a14">
+      <mc:AlternateContent xmlns:mc="http://schemas.openxmlformats.org/markup-compatibility/2006" xmlns:a14="http://schemas.microsoft.com/office/drawing/2010/main">
+        <mc:Choice Requires="a14">
           <p:sp>
             <p:nvSpPr>
               <p:cNvPr id="34" name="Rectangle 33">
@@ -8248,7 +8256,7 @@
             </p:txBody>
           </p:sp>
         </mc:Choice>
-        <mc:Fallback>
+        <mc:Fallback xmlns="">
           <p:sp>
             <p:nvSpPr>
               <p:cNvPr id="34" name="Rectangle 33">
@@ -8753,8 +8761,8 @@
           </a:fontRef>
         </p:style>
       </p:cxnSp>
-      <mc:AlternateContent xmlns:mc="http://schemas.openxmlformats.org/markup-compatibility/2006">
-        <mc:Choice xmlns:a14="http://schemas.microsoft.com/office/drawing/2010/main" Requires="a14">
+      <mc:AlternateContent xmlns:mc="http://schemas.openxmlformats.org/markup-compatibility/2006" xmlns:a14="http://schemas.microsoft.com/office/drawing/2010/main">
+        <mc:Choice Requires="a14">
           <p:sp>
             <p:nvSpPr>
               <p:cNvPr id="108" name="Rectangle 107">
@@ -8856,7 +8864,7 @@
             </p:txBody>
           </p:sp>
         </mc:Choice>
-        <mc:Fallback>
+        <mc:Fallback xmlns="">
           <p:sp>
             <p:nvSpPr>
               <p:cNvPr id="108" name="Rectangle 107">
@@ -8906,8 +8914,8 @@
           </p:sp>
         </mc:Fallback>
       </mc:AlternateContent>
-      <mc:AlternateContent xmlns:mc="http://schemas.openxmlformats.org/markup-compatibility/2006">
-        <mc:Choice xmlns:a14="http://schemas.microsoft.com/office/drawing/2010/main" Requires="a14">
+      <mc:AlternateContent xmlns:mc="http://schemas.openxmlformats.org/markup-compatibility/2006" xmlns:a14="http://schemas.microsoft.com/office/drawing/2010/main">
+        <mc:Choice Requires="a14">
           <p:sp>
             <p:nvSpPr>
               <p:cNvPr id="109" name="Rectangle 108">
@@ -9009,7 +9017,7 @@
             </p:txBody>
           </p:sp>
         </mc:Choice>
-        <mc:Fallback>
+        <mc:Fallback xmlns="">
           <p:sp>
             <p:nvSpPr>
               <p:cNvPr id="109" name="Rectangle 108">
@@ -9059,8 +9067,8 @@
           </p:sp>
         </mc:Fallback>
       </mc:AlternateContent>
-      <mc:AlternateContent xmlns:mc="http://schemas.openxmlformats.org/markup-compatibility/2006">
-        <mc:Choice xmlns:a14="http://schemas.microsoft.com/office/drawing/2010/main" Requires="a14">
+      <mc:AlternateContent xmlns:mc="http://schemas.openxmlformats.org/markup-compatibility/2006" xmlns:a14="http://schemas.microsoft.com/office/drawing/2010/main">
+        <mc:Choice Requires="a14">
           <p:sp>
             <p:nvSpPr>
               <p:cNvPr id="110" name="Rectangle 109">
@@ -9141,7 +9149,7 @@
             </p:txBody>
           </p:sp>
         </mc:Choice>
-        <mc:Fallback>
+        <mc:Fallback xmlns="">
           <p:sp>
             <p:nvSpPr>
               <p:cNvPr id="110" name="Rectangle 109">
@@ -9191,8 +9199,8 @@
           </p:sp>
         </mc:Fallback>
       </mc:AlternateContent>
-      <mc:AlternateContent xmlns:mc="http://schemas.openxmlformats.org/markup-compatibility/2006">
-        <mc:Choice xmlns:a14="http://schemas.microsoft.com/office/drawing/2010/main" Requires="a14">
+      <mc:AlternateContent xmlns:mc="http://schemas.openxmlformats.org/markup-compatibility/2006" xmlns:a14="http://schemas.microsoft.com/office/drawing/2010/main">
+        <mc:Choice Requires="a14">
           <p:sp>
             <p:nvSpPr>
               <p:cNvPr id="111" name="Rectangle 110">
@@ -9302,7 +9310,7 @@
             </p:txBody>
           </p:sp>
         </mc:Choice>
-        <mc:Fallback>
+        <mc:Fallback xmlns="">
           <p:sp>
             <p:nvSpPr>
               <p:cNvPr id="111" name="Rectangle 110">
@@ -9352,8 +9360,8 @@
           </p:sp>
         </mc:Fallback>
       </mc:AlternateContent>
-      <mc:AlternateContent xmlns:mc="http://schemas.openxmlformats.org/markup-compatibility/2006">
-        <mc:Choice xmlns:a14="http://schemas.microsoft.com/office/drawing/2010/main" Requires="a14">
+      <mc:AlternateContent xmlns:mc="http://schemas.openxmlformats.org/markup-compatibility/2006" xmlns:a14="http://schemas.microsoft.com/office/drawing/2010/main">
+        <mc:Choice Requires="a14">
           <p:sp>
             <p:nvSpPr>
               <p:cNvPr id="112" name="Rectangle 111">
@@ -9454,7 +9462,7 @@
             </p:txBody>
           </p:sp>
         </mc:Choice>
-        <mc:Fallback>
+        <mc:Fallback xmlns="">
           <p:sp>
             <p:nvSpPr>
               <p:cNvPr id="112" name="Rectangle 111">
@@ -9504,8 +9512,8 @@
           </p:sp>
         </mc:Fallback>
       </mc:AlternateContent>
-      <mc:AlternateContent xmlns:mc="http://schemas.openxmlformats.org/markup-compatibility/2006">
-        <mc:Choice xmlns:a14="http://schemas.microsoft.com/office/drawing/2010/main" Requires="a14">
+      <mc:AlternateContent xmlns:mc="http://schemas.openxmlformats.org/markup-compatibility/2006" xmlns:a14="http://schemas.microsoft.com/office/drawing/2010/main">
+        <mc:Choice Requires="a14">
           <p:sp>
             <p:nvSpPr>
               <p:cNvPr id="151" name="TextBox 150">
@@ -9534,6 +9542,7 @@
               </a:bodyPr>
               <a:lstStyle/>
               <a:p>
+                <a:pPr/>
                 <a14:m>
                   <m:oMathPara xmlns:m="http://schemas.openxmlformats.org/officeDocument/2006/math">
                     <m:oMathParaPr>
@@ -9572,7 +9581,7 @@
             </p:txBody>
           </p:sp>
         </mc:Choice>
-        <mc:Fallback>
+        <mc:Fallback xmlns="">
           <p:sp>
             <p:nvSpPr>
               <p:cNvPr id="151" name="TextBox 150">
@@ -9617,8 +9626,8 @@
           </p:sp>
         </mc:Fallback>
       </mc:AlternateContent>
-      <mc:AlternateContent xmlns:mc="http://schemas.openxmlformats.org/markup-compatibility/2006">
-        <mc:Choice xmlns:a14="http://schemas.microsoft.com/office/drawing/2010/main" Requires="a14">
+      <mc:AlternateContent xmlns:mc="http://schemas.openxmlformats.org/markup-compatibility/2006" xmlns:a14="http://schemas.microsoft.com/office/drawing/2010/main">
+        <mc:Choice Requires="a14">
           <p:sp>
             <p:nvSpPr>
               <p:cNvPr id="57" name="Rectangle 56">
@@ -9689,7 +9698,7 @@
             </p:txBody>
           </p:sp>
         </mc:Choice>
-        <mc:Fallback>
+        <mc:Fallback xmlns="">
           <p:sp>
             <p:nvSpPr>
               <p:cNvPr id="57" name="Rectangle 56">
@@ -9739,8 +9748,8 @@
           </p:sp>
         </mc:Fallback>
       </mc:AlternateContent>
-      <mc:AlternateContent xmlns:mc="http://schemas.openxmlformats.org/markup-compatibility/2006">
-        <mc:Choice xmlns:a14="http://schemas.microsoft.com/office/drawing/2010/main" Requires="a14">
+      <mc:AlternateContent xmlns:mc="http://schemas.openxmlformats.org/markup-compatibility/2006" xmlns:a14="http://schemas.microsoft.com/office/drawing/2010/main">
+        <mc:Choice Requires="a14">
           <p:sp>
             <p:nvSpPr>
               <p:cNvPr id="62" name="Rounded Rectangle 61">
@@ -9835,7 +9844,7 @@
             </p:txBody>
           </p:sp>
         </mc:Choice>
-        <mc:Fallback>
+        <mc:Fallback xmlns="">
           <p:sp>
             <p:nvSpPr>
               <p:cNvPr id="62" name="Rounded Rectangle 61">
@@ -10084,8 +10093,8 @@
           </a:fontRef>
         </p:style>
       </p:cxnSp>
-      <mc:AlternateContent xmlns:mc="http://schemas.openxmlformats.org/markup-compatibility/2006">
-        <mc:Choice xmlns:a14="http://schemas.microsoft.com/office/drawing/2010/main" Requires="a14">
+      <mc:AlternateContent xmlns:mc="http://schemas.openxmlformats.org/markup-compatibility/2006" xmlns:a14="http://schemas.microsoft.com/office/drawing/2010/main">
+        <mc:Choice Requires="a14">
           <p:sp>
             <p:nvSpPr>
               <p:cNvPr id="87" name="Rectangle 86">
@@ -10175,7 +10184,7 @@
             </p:txBody>
           </p:sp>
         </mc:Choice>
-        <mc:Fallback>
+        <mc:Fallback xmlns="">
           <p:sp>
             <p:nvSpPr>
               <p:cNvPr id="87" name="Rectangle 86">
@@ -10225,8 +10234,8 @@
           </p:sp>
         </mc:Fallback>
       </mc:AlternateContent>
-      <mc:AlternateContent xmlns:mc="http://schemas.openxmlformats.org/markup-compatibility/2006">
-        <mc:Choice xmlns:a14="http://schemas.microsoft.com/office/drawing/2010/main" Requires="a14">
+      <mc:AlternateContent xmlns:mc="http://schemas.openxmlformats.org/markup-compatibility/2006" xmlns:a14="http://schemas.microsoft.com/office/drawing/2010/main">
+        <mc:Choice Requires="a14">
           <p:sp>
             <p:nvSpPr>
               <p:cNvPr id="90" name="Rectangle 89">
@@ -10327,7 +10336,7 @@
             </p:txBody>
           </p:sp>
         </mc:Choice>
-        <mc:Fallback>
+        <mc:Fallback xmlns="">
           <p:sp>
             <p:nvSpPr>
               <p:cNvPr id="90" name="Rectangle 89">
@@ -10377,8 +10386,8 @@
           </p:sp>
         </mc:Fallback>
       </mc:AlternateContent>
-      <mc:AlternateContent xmlns:mc="http://schemas.openxmlformats.org/markup-compatibility/2006">
-        <mc:Choice xmlns:a14="http://schemas.microsoft.com/office/drawing/2010/main" Requires="a14">
+      <mc:AlternateContent xmlns:mc="http://schemas.openxmlformats.org/markup-compatibility/2006" xmlns:a14="http://schemas.microsoft.com/office/drawing/2010/main">
+        <mc:Choice Requires="a14">
           <p:sp>
             <p:nvSpPr>
               <p:cNvPr id="91" name="Rectangle 90">
@@ -10479,7 +10488,7 @@
             </p:txBody>
           </p:sp>
         </mc:Choice>
-        <mc:Fallback>
+        <mc:Fallback xmlns="">
           <p:sp>
             <p:nvSpPr>
               <p:cNvPr id="91" name="Rectangle 90">
@@ -10529,8 +10538,8 @@
           </p:sp>
         </mc:Fallback>
       </mc:AlternateContent>
-      <mc:AlternateContent xmlns:mc="http://schemas.openxmlformats.org/markup-compatibility/2006">
-        <mc:Choice xmlns:a14="http://schemas.microsoft.com/office/drawing/2010/main" Requires="a14">
+      <mc:AlternateContent xmlns:mc="http://schemas.openxmlformats.org/markup-compatibility/2006" xmlns:a14="http://schemas.microsoft.com/office/drawing/2010/main">
+        <mc:Choice Requires="a14">
           <p:sp>
             <p:nvSpPr>
               <p:cNvPr id="92" name="Rectangle 91">
@@ -10610,7 +10619,7 @@
             </p:txBody>
           </p:sp>
         </mc:Choice>
-        <mc:Fallback>
+        <mc:Fallback xmlns="">
           <p:sp>
             <p:nvSpPr>
               <p:cNvPr id="92" name="Rectangle 91">
@@ -10660,8 +10669,8 @@
           </p:sp>
         </mc:Fallback>
       </mc:AlternateContent>
-      <mc:AlternateContent xmlns:mc="http://schemas.openxmlformats.org/markup-compatibility/2006">
-        <mc:Choice xmlns:a14="http://schemas.microsoft.com/office/drawing/2010/main" Requires="a14">
+      <mc:AlternateContent xmlns:mc="http://schemas.openxmlformats.org/markup-compatibility/2006" xmlns:a14="http://schemas.microsoft.com/office/drawing/2010/main">
+        <mc:Choice Requires="a14">
           <p:sp>
             <p:nvSpPr>
               <p:cNvPr id="93" name="Rectangle 92">
@@ -10771,7 +10780,7 @@
             </p:txBody>
           </p:sp>
         </mc:Choice>
-        <mc:Fallback>
+        <mc:Fallback xmlns="">
           <p:sp>
             <p:nvSpPr>
               <p:cNvPr id="93" name="Rectangle 92">
@@ -10821,8 +10830,8 @@
           </p:sp>
         </mc:Fallback>
       </mc:AlternateContent>
-      <mc:AlternateContent xmlns:mc="http://schemas.openxmlformats.org/markup-compatibility/2006">
-        <mc:Choice xmlns:a14="http://schemas.microsoft.com/office/drawing/2010/main" Requires="a14">
+      <mc:AlternateContent xmlns:mc="http://schemas.openxmlformats.org/markup-compatibility/2006" xmlns:a14="http://schemas.microsoft.com/office/drawing/2010/main">
+        <mc:Choice Requires="a14">
           <p:sp>
             <p:nvSpPr>
               <p:cNvPr id="94" name="Rectangle 93">
@@ -10923,7 +10932,7 @@
             </p:txBody>
           </p:sp>
         </mc:Choice>
-        <mc:Fallback>
+        <mc:Fallback xmlns="">
           <p:sp>
             <p:nvSpPr>
               <p:cNvPr id="94" name="Rectangle 93">
@@ -11017,8 +11026,8 @@
           </a:fontRef>
         </p:style>
       </p:cxnSp>
-      <mc:AlternateContent xmlns:mc="http://schemas.openxmlformats.org/markup-compatibility/2006">
-        <mc:Choice xmlns:a14="http://schemas.microsoft.com/office/drawing/2010/main" Requires="a14">
+      <mc:AlternateContent xmlns:mc="http://schemas.openxmlformats.org/markup-compatibility/2006" xmlns:a14="http://schemas.microsoft.com/office/drawing/2010/main">
+        <mc:Choice Requires="a14">
           <p:sp>
             <p:nvSpPr>
               <p:cNvPr id="104" name="Rounded Rectangle 103">
@@ -11101,7 +11110,7 @@
             </p:txBody>
           </p:sp>
         </mc:Choice>
-        <mc:Fallback>
+        <mc:Fallback xmlns="">
           <p:sp>
             <p:nvSpPr>
               <p:cNvPr id="104" name="Rounded Rectangle 103">
@@ -11237,8 +11246,8 @@
           </a:fontRef>
         </p:style>
       </p:cxnSp>
-      <mc:AlternateContent xmlns:mc="http://schemas.openxmlformats.org/markup-compatibility/2006">
-        <mc:Choice xmlns:a14="http://schemas.microsoft.com/office/drawing/2010/main" Requires="a14">
+      <mc:AlternateContent xmlns:mc="http://schemas.openxmlformats.org/markup-compatibility/2006" xmlns:a14="http://schemas.microsoft.com/office/drawing/2010/main">
+        <mc:Choice Requires="a14">
           <p:sp>
             <p:nvSpPr>
               <p:cNvPr id="135" name="TextBox 134">
@@ -11294,7 +11303,7 @@
             </p:txBody>
           </p:sp>
         </mc:Choice>
-        <mc:Fallback>
+        <mc:Fallback xmlns="">
           <p:sp>
             <p:nvSpPr>
               <p:cNvPr id="135" name="TextBox 134">
@@ -11656,8 +11665,8 @@
           </a:p>
         </p:txBody>
       </p:sp>
-      <mc:AlternateContent xmlns:mc="http://schemas.openxmlformats.org/markup-compatibility/2006">
-        <mc:Choice xmlns:a14="http://schemas.microsoft.com/office/drawing/2010/main" Requires="a14">
+      <mc:AlternateContent xmlns:mc="http://schemas.openxmlformats.org/markup-compatibility/2006" xmlns:a14="http://schemas.microsoft.com/office/drawing/2010/main">
+        <mc:Choice Requires="a14">
           <p:sp>
             <p:nvSpPr>
               <p:cNvPr id="43" name="Rectangle 42">
@@ -11728,7 +11737,7 @@
             </p:txBody>
           </p:sp>
         </mc:Choice>
-        <mc:Fallback>
+        <mc:Fallback xmlns="">
           <p:sp>
             <p:nvSpPr>
               <p:cNvPr id="43" name="Rectangle 42">
@@ -11888,8 +11897,8 @@
           </a:p>
         </p:txBody>
       </p:sp>
-      <mc:AlternateContent xmlns:mc="http://schemas.openxmlformats.org/markup-compatibility/2006">
-        <mc:Choice xmlns:a14="http://schemas.microsoft.com/office/drawing/2010/main" Requires="a14">
+      <mc:AlternateContent xmlns:mc="http://schemas.openxmlformats.org/markup-compatibility/2006" xmlns:a14="http://schemas.microsoft.com/office/drawing/2010/main">
+        <mc:Choice Requires="a14">
           <p:sp>
             <p:nvSpPr>
               <p:cNvPr id="46" name="Rectangle 45">
@@ -11968,7 +11977,7 @@
             </p:txBody>
           </p:sp>
         </mc:Choice>
-        <mc:Fallback>
+        <mc:Fallback xmlns="">
           <p:sp>
             <p:nvSpPr>
               <p:cNvPr id="46" name="Rectangle 45">
@@ -12340,8 +12349,8 @@
           </a:solidFill>
         </p:spPr>
       </p:pic>
-      <mc:AlternateContent xmlns:mc="http://schemas.openxmlformats.org/markup-compatibility/2006">
-        <mc:Choice xmlns:a14="http://schemas.microsoft.com/office/drawing/2010/main" Requires="a14">
+      <mc:AlternateContent xmlns:mc="http://schemas.openxmlformats.org/markup-compatibility/2006" xmlns:a14="http://schemas.microsoft.com/office/drawing/2010/main">
+        <mc:Choice Requires="a14">
           <p:sp>
             <p:nvSpPr>
               <p:cNvPr id="54" name="TextBox 53">
@@ -12370,6 +12379,7 @@
               </a:bodyPr>
               <a:lstStyle/>
               <a:p>
+                <a:pPr/>
                 <a14:m>
                   <m:oMathPara xmlns:m="http://schemas.openxmlformats.org/officeDocument/2006/math">
                     <m:oMathParaPr>
@@ -12408,7 +12418,7 @@
             </p:txBody>
           </p:sp>
         </mc:Choice>
-        <mc:Fallback>
+        <mc:Fallback xmlns="">
           <p:sp>
             <p:nvSpPr>
               <p:cNvPr id="54" name="TextBox 53">
@@ -12519,8 +12529,8 @@
           </a:p>
         </p:txBody>
       </p:sp>
-      <mc:AlternateContent xmlns:mc="http://schemas.openxmlformats.org/markup-compatibility/2006">
-        <mc:Choice xmlns:a14="http://schemas.microsoft.com/office/drawing/2010/main" Requires="a14">
+      <mc:AlternateContent xmlns:mc="http://schemas.openxmlformats.org/markup-compatibility/2006" xmlns:a14="http://schemas.microsoft.com/office/drawing/2010/main">
+        <mc:Choice Requires="a14">
           <p:sp>
             <p:nvSpPr>
               <p:cNvPr id="56" name="Rectangle 55">
@@ -12622,7 +12632,7 @@
             </p:txBody>
           </p:sp>
         </mc:Choice>
-        <mc:Fallback>
+        <mc:Fallback xmlns="">
           <p:sp>
             <p:nvSpPr>
               <p:cNvPr id="56" name="Rectangle 55">
@@ -12672,8 +12682,8 @@
           </p:sp>
         </mc:Fallback>
       </mc:AlternateContent>
-      <mc:AlternateContent xmlns:mc="http://schemas.openxmlformats.org/markup-compatibility/2006">
-        <mc:Choice xmlns:a14="http://schemas.microsoft.com/office/drawing/2010/main" Requires="a14">
+      <mc:AlternateContent xmlns:mc="http://schemas.openxmlformats.org/markup-compatibility/2006" xmlns:a14="http://schemas.microsoft.com/office/drawing/2010/main">
+        <mc:Choice Requires="a14">
           <p:sp>
             <p:nvSpPr>
               <p:cNvPr id="58" name="Rectangle 57">
@@ -12775,7 +12785,7 @@
             </p:txBody>
           </p:sp>
         </mc:Choice>
-        <mc:Fallback>
+        <mc:Fallback xmlns="">
           <p:sp>
             <p:nvSpPr>
               <p:cNvPr id="58" name="Rectangle 57">
@@ -12825,8 +12835,8 @@
           </p:sp>
         </mc:Fallback>
       </mc:AlternateContent>
-      <mc:AlternateContent xmlns:mc="http://schemas.openxmlformats.org/markup-compatibility/2006">
-        <mc:Choice xmlns:a14="http://schemas.microsoft.com/office/drawing/2010/main" Requires="a14">
+      <mc:AlternateContent xmlns:mc="http://schemas.openxmlformats.org/markup-compatibility/2006" xmlns:a14="http://schemas.microsoft.com/office/drawing/2010/main">
+        <mc:Choice Requires="a14">
           <p:sp>
             <p:nvSpPr>
               <p:cNvPr id="60" name="Rectangle 59">
@@ -12907,7 +12917,7 @@
             </p:txBody>
           </p:sp>
         </mc:Choice>
-        <mc:Fallback>
+        <mc:Fallback xmlns="">
           <p:sp>
             <p:nvSpPr>
               <p:cNvPr id="60" name="Rectangle 59">
@@ -12957,8 +12967,8 @@
           </p:sp>
         </mc:Fallback>
       </mc:AlternateContent>
-      <mc:AlternateContent xmlns:mc="http://schemas.openxmlformats.org/markup-compatibility/2006">
-        <mc:Choice xmlns:a14="http://schemas.microsoft.com/office/drawing/2010/main" Requires="a14">
+      <mc:AlternateContent xmlns:mc="http://schemas.openxmlformats.org/markup-compatibility/2006" xmlns:a14="http://schemas.microsoft.com/office/drawing/2010/main">
+        <mc:Choice Requires="a14">
           <p:sp>
             <p:nvSpPr>
               <p:cNvPr id="65" name="Rectangle 64">
@@ -13068,7 +13078,7 @@
             </p:txBody>
           </p:sp>
         </mc:Choice>
-        <mc:Fallback>
+        <mc:Fallback xmlns="">
           <p:sp>
             <p:nvSpPr>
               <p:cNvPr id="65" name="Rectangle 64">
@@ -13118,8 +13128,8 @@
           </p:sp>
         </mc:Fallback>
       </mc:AlternateContent>
-      <mc:AlternateContent xmlns:mc="http://schemas.openxmlformats.org/markup-compatibility/2006">
-        <mc:Choice xmlns:a14="http://schemas.microsoft.com/office/drawing/2010/main" Requires="a14">
+      <mc:AlternateContent xmlns:mc="http://schemas.openxmlformats.org/markup-compatibility/2006" xmlns:a14="http://schemas.microsoft.com/office/drawing/2010/main">
+        <mc:Choice Requires="a14">
           <p:sp>
             <p:nvSpPr>
               <p:cNvPr id="67" name="Rectangle 66">
@@ -13220,7 +13230,7 @@
             </p:txBody>
           </p:sp>
         </mc:Choice>
-        <mc:Fallback>
+        <mc:Fallback xmlns="">
           <p:sp>
             <p:nvSpPr>
               <p:cNvPr id="67" name="Rectangle 66">
@@ -13270,8 +13280,8 @@
           </p:sp>
         </mc:Fallback>
       </mc:AlternateContent>
-      <mc:AlternateContent xmlns:mc="http://schemas.openxmlformats.org/markup-compatibility/2006">
-        <mc:Choice xmlns:a14="http://schemas.microsoft.com/office/drawing/2010/main" Requires="a14">
+      <mc:AlternateContent xmlns:mc="http://schemas.openxmlformats.org/markup-compatibility/2006" xmlns:a14="http://schemas.microsoft.com/office/drawing/2010/main">
+        <mc:Choice Requires="a14">
           <p:sp>
             <p:nvSpPr>
               <p:cNvPr id="85" name="Rectangle 84">
@@ -13361,7 +13371,7 @@
             </p:txBody>
           </p:sp>
         </mc:Choice>
-        <mc:Fallback>
+        <mc:Fallback xmlns="">
           <p:sp>
             <p:nvSpPr>
               <p:cNvPr id="85" name="Rectangle 84">
@@ -13483,8 +13493,8 @@
           </a:p>
         </p:txBody>
       </p:sp>
-      <mc:AlternateContent xmlns:mc="http://schemas.openxmlformats.org/markup-compatibility/2006">
-        <mc:Choice xmlns:a14="http://schemas.microsoft.com/office/drawing/2010/main" Requires="a14">
+      <mc:AlternateContent xmlns:mc="http://schemas.openxmlformats.org/markup-compatibility/2006" xmlns:a14="http://schemas.microsoft.com/office/drawing/2010/main">
+        <mc:Choice Requires="a14">
           <p:sp>
             <p:nvSpPr>
               <p:cNvPr id="89" name="Rounded Rectangle 88">
@@ -13567,7 +13577,7 @@
             </p:txBody>
           </p:sp>
         </mc:Choice>
-        <mc:Fallback>
+        <mc:Fallback xmlns="">
           <p:sp>
             <p:nvSpPr>
               <p:cNvPr id="89" name="Rounded Rectangle 88">
@@ -13800,8 +13810,8 @@
           </a:solidFill>
         </p:spPr>
       </p:pic>
-      <mc:AlternateContent xmlns:mc="http://schemas.openxmlformats.org/markup-compatibility/2006">
-        <mc:Choice xmlns:a14="http://schemas.microsoft.com/office/drawing/2010/main" Requires="a14">
+      <mc:AlternateContent xmlns:mc="http://schemas.openxmlformats.org/markup-compatibility/2006" xmlns:a14="http://schemas.microsoft.com/office/drawing/2010/main">
+        <mc:Choice Requires="a14">
           <p:sp>
             <p:nvSpPr>
               <p:cNvPr id="101" name="Rectangle 100">
@@ -13902,7 +13912,7 @@
             </p:txBody>
           </p:sp>
         </mc:Choice>
-        <mc:Fallback>
+        <mc:Fallback xmlns="">
           <p:sp>
             <p:nvSpPr>
               <p:cNvPr id="101" name="Rectangle 100">
@@ -13952,8 +13962,8 @@
           </p:sp>
         </mc:Fallback>
       </mc:AlternateContent>
-      <mc:AlternateContent xmlns:mc="http://schemas.openxmlformats.org/markup-compatibility/2006">
-        <mc:Choice xmlns:a14="http://schemas.microsoft.com/office/drawing/2010/main" Requires="a14">
+      <mc:AlternateContent xmlns:mc="http://schemas.openxmlformats.org/markup-compatibility/2006" xmlns:a14="http://schemas.microsoft.com/office/drawing/2010/main">
+        <mc:Choice Requires="a14">
           <p:sp>
             <p:nvSpPr>
               <p:cNvPr id="102" name="Rectangle 101">
@@ -14054,7 +14064,7 @@
             </p:txBody>
           </p:sp>
         </mc:Choice>
-        <mc:Fallback>
+        <mc:Fallback xmlns="">
           <p:sp>
             <p:nvSpPr>
               <p:cNvPr id="102" name="Rectangle 101">
@@ -14104,8 +14114,8 @@
           </p:sp>
         </mc:Fallback>
       </mc:AlternateContent>
-      <mc:AlternateContent xmlns:mc="http://schemas.openxmlformats.org/markup-compatibility/2006">
-        <mc:Choice xmlns:a14="http://schemas.microsoft.com/office/drawing/2010/main" Requires="a14">
+      <mc:AlternateContent xmlns:mc="http://schemas.openxmlformats.org/markup-compatibility/2006" xmlns:a14="http://schemas.microsoft.com/office/drawing/2010/main">
+        <mc:Choice Requires="a14">
           <p:sp>
             <p:nvSpPr>
               <p:cNvPr id="103" name="Rectangle 102">
@@ -14185,7 +14195,7 @@
             </p:txBody>
           </p:sp>
         </mc:Choice>
-        <mc:Fallback>
+        <mc:Fallback xmlns="">
           <p:sp>
             <p:nvSpPr>
               <p:cNvPr id="103" name="Rectangle 102">
@@ -14235,8 +14245,8 @@
           </p:sp>
         </mc:Fallback>
       </mc:AlternateContent>
-      <mc:AlternateContent xmlns:mc="http://schemas.openxmlformats.org/markup-compatibility/2006">
-        <mc:Choice xmlns:a14="http://schemas.microsoft.com/office/drawing/2010/main" Requires="a14">
+      <mc:AlternateContent xmlns:mc="http://schemas.openxmlformats.org/markup-compatibility/2006" xmlns:a14="http://schemas.microsoft.com/office/drawing/2010/main">
+        <mc:Choice Requires="a14">
           <p:sp>
             <p:nvSpPr>
               <p:cNvPr id="104" name="Rectangle 103">
@@ -14346,7 +14356,7 @@
             </p:txBody>
           </p:sp>
         </mc:Choice>
-        <mc:Fallback>
+        <mc:Fallback xmlns="">
           <p:sp>
             <p:nvSpPr>
               <p:cNvPr id="104" name="Rectangle 103">
@@ -14396,8 +14406,8 @@
           </p:sp>
         </mc:Fallback>
       </mc:AlternateContent>
-      <mc:AlternateContent xmlns:mc="http://schemas.openxmlformats.org/markup-compatibility/2006">
-        <mc:Choice xmlns:a14="http://schemas.microsoft.com/office/drawing/2010/main" Requires="a14">
+      <mc:AlternateContent xmlns:mc="http://schemas.openxmlformats.org/markup-compatibility/2006" xmlns:a14="http://schemas.microsoft.com/office/drawing/2010/main">
+        <mc:Choice Requires="a14">
           <p:sp>
             <p:nvSpPr>
               <p:cNvPr id="105" name="Rectangle 104">
@@ -14498,7 +14508,7 @@
             </p:txBody>
           </p:sp>
         </mc:Choice>
-        <mc:Fallback>
+        <mc:Fallback xmlns="">
           <p:sp>
             <p:nvSpPr>
               <p:cNvPr id="105" name="Rectangle 104">
@@ -15105,8 +15115,8 @@
           </a:p>
         </p:txBody>
       </p:sp>
-      <mc:AlternateContent xmlns:mc="http://schemas.openxmlformats.org/markup-compatibility/2006">
-        <mc:Choice xmlns:a14="http://schemas.microsoft.com/office/drawing/2010/main" Requires="a14">
+      <mc:AlternateContent xmlns:mc="http://schemas.openxmlformats.org/markup-compatibility/2006" xmlns:a14="http://schemas.microsoft.com/office/drawing/2010/main">
+        <mc:Choice Requires="a14">
           <p:sp>
             <p:nvSpPr>
               <p:cNvPr id="34" name="Rectangle 33">
@@ -15185,7 +15195,7 @@
             </p:txBody>
           </p:sp>
         </mc:Choice>
-        <mc:Fallback>
+        <mc:Fallback xmlns="">
           <p:sp>
             <p:nvSpPr>
               <p:cNvPr id="34" name="Rectangle 33">
@@ -15690,8 +15700,8 @@
           </a:fontRef>
         </p:style>
       </p:cxnSp>
-      <mc:AlternateContent xmlns:mc="http://schemas.openxmlformats.org/markup-compatibility/2006">
-        <mc:Choice xmlns:a14="http://schemas.microsoft.com/office/drawing/2010/main" Requires="a14">
+      <mc:AlternateContent xmlns:mc="http://schemas.openxmlformats.org/markup-compatibility/2006" xmlns:a14="http://schemas.microsoft.com/office/drawing/2010/main">
+        <mc:Choice Requires="a14">
           <p:sp>
             <p:nvSpPr>
               <p:cNvPr id="108" name="Rectangle 107">
@@ -15793,7 +15803,7 @@
             </p:txBody>
           </p:sp>
         </mc:Choice>
-        <mc:Fallback>
+        <mc:Fallback xmlns="">
           <p:sp>
             <p:nvSpPr>
               <p:cNvPr id="108" name="Rectangle 107">
@@ -15843,8 +15853,8 @@
           </p:sp>
         </mc:Fallback>
       </mc:AlternateContent>
-      <mc:AlternateContent xmlns:mc="http://schemas.openxmlformats.org/markup-compatibility/2006">
-        <mc:Choice xmlns:a14="http://schemas.microsoft.com/office/drawing/2010/main" Requires="a14">
+      <mc:AlternateContent xmlns:mc="http://schemas.openxmlformats.org/markup-compatibility/2006" xmlns:a14="http://schemas.microsoft.com/office/drawing/2010/main">
+        <mc:Choice Requires="a14">
           <p:sp>
             <p:nvSpPr>
               <p:cNvPr id="109" name="Rectangle 108">
@@ -15946,7 +15956,7 @@
             </p:txBody>
           </p:sp>
         </mc:Choice>
-        <mc:Fallback>
+        <mc:Fallback xmlns="">
           <p:sp>
             <p:nvSpPr>
               <p:cNvPr id="109" name="Rectangle 108">
@@ -15996,8 +16006,8 @@
           </p:sp>
         </mc:Fallback>
       </mc:AlternateContent>
-      <mc:AlternateContent xmlns:mc="http://schemas.openxmlformats.org/markup-compatibility/2006">
-        <mc:Choice xmlns:a14="http://schemas.microsoft.com/office/drawing/2010/main" Requires="a14">
+      <mc:AlternateContent xmlns:mc="http://schemas.openxmlformats.org/markup-compatibility/2006" xmlns:a14="http://schemas.microsoft.com/office/drawing/2010/main">
+        <mc:Choice Requires="a14">
           <p:sp>
             <p:nvSpPr>
               <p:cNvPr id="110" name="Rectangle 109">
@@ -16078,7 +16088,7 @@
             </p:txBody>
           </p:sp>
         </mc:Choice>
-        <mc:Fallback>
+        <mc:Fallback xmlns="">
           <p:sp>
             <p:nvSpPr>
               <p:cNvPr id="110" name="Rectangle 109">
@@ -16128,8 +16138,8 @@
           </p:sp>
         </mc:Fallback>
       </mc:AlternateContent>
-      <mc:AlternateContent xmlns:mc="http://schemas.openxmlformats.org/markup-compatibility/2006">
-        <mc:Choice xmlns:a14="http://schemas.microsoft.com/office/drawing/2010/main" Requires="a14">
+      <mc:AlternateContent xmlns:mc="http://schemas.openxmlformats.org/markup-compatibility/2006" xmlns:a14="http://schemas.microsoft.com/office/drawing/2010/main">
+        <mc:Choice Requires="a14">
           <p:sp>
             <p:nvSpPr>
               <p:cNvPr id="111" name="Rectangle 110">
@@ -16239,7 +16249,7 @@
             </p:txBody>
           </p:sp>
         </mc:Choice>
-        <mc:Fallback>
+        <mc:Fallback xmlns="">
           <p:sp>
             <p:nvSpPr>
               <p:cNvPr id="111" name="Rectangle 110">
@@ -16289,8 +16299,8 @@
           </p:sp>
         </mc:Fallback>
       </mc:AlternateContent>
-      <mc:AlternateContent xmlns:mc="http://schemas.openxmlformats.org/markup-compatibility/2006">
-        <mc:Choice xmlns:a14="http://schemas.microsoft.com/office/drawing/2010/main" Requires="a14">
+      <mc:AlternateContent xmlns:mc="http://schemas.openxmlformats.org/markup-compatibility/2006" xmlns:a14="http://schemas.microsoft.com/office/drawing/2010/main">
+        <mc:Choice Requires="a14">
           <p:sp>
             <p:nvSpPr>
               <p:cNvPr id="112" name="Rectangle 111">
@@ -16391,7 +16401,7 @@
             </p:txBody>
           </p:sp>
         </mc:Choice>
-        <mc:Fallback>
+        <mc:Fallback xmlns="">
           <p:sp>
             <p:nvSpPr>
               <p:cNvPr id="112" name="Rectangle 111">
@@ -16441,8 +16451,8 @@
           </p:sp>
         </mc:Fallback>
       </mc:AlternateContent>
-      <mc:AlternateContent xmlns:mc="http://schemas.openxmlformats.org/markup-compatibility/2006">
-        <mc:Choice xmlns:a14="http://schemas.microsoft.com/office/drawing/2010/main" Requires="a14">
+      <mc:AlternateContent xmlns:mc="http://schemas.openxmlformats.org/markup-compatibility/2006" xmlns:a14="http://schemas.microsoft.com/office/drawing/2010/main">
+        <mc:Choice Requires="a14">
           <p:sp>
             <p:nvSpPr>
               <p:cNvPr id="151" name="TextBox 150">
@@ -16471,6 +16481,7 @@
               </a:bodyPr>
               <a:lstStyle/>
               <a:p>
+                <a:pPr/>
                 <a14:m>
                   <m:oMathPara xmlns:m="http://schemas.openxmlformats.org/officeDocument/2006/math">
                     <m:oMathParaPr>
@@ -16509,7 +16520,7 @@
             </p:txBody>
           </p:sp>
         </mc:Choice>
-        <mc:Fallback>
+        <mc:Fallback xmlns="">
           <p:sp>
             <p:nvSpPr>
               <p:cNvPr id="151" name="TextBox 150">
@@ -16554,8 +16565,8 @@
           </p:sp>
         </mc:Fallback>
       </mc:AlternateContent>
-      <mc:AlternateContent xmlns:mc="http://schemas.openxmlformats.org/markup-compatibility/2006">
-        <mc:Choice xmlns:a14="http://schemas.microsoft.com/office/drawing/2010/main" Requires="a14">
+      <mc:AlternateContent xmlns:mc="http://schemas.openxmlformats.org/markup-compatibility/2006" xmlns:a14="http://schemas.microsoft.com/office/drawing/2010/main">
+        <mc:Choice Requires="a14">
           <p:sp>
             <p:nvSpPr>
               <p:cNvPr id="57" name="Rectangle 56">
@@ -16626,7 +16637,7 @@
             </p:txBody>
           </p:sp>
         </mc:Choice>
-        <mc:Fallback>
+        <mc:Fallback xmlns="">
           <p:sp>
             <p:nvSpPr>
               <p:cNvPr id="57" name="Rectangle 56">
@@ -16676,8 +16687,8 @@
           </p:sp>
         </mc:Fallback>
       </mc:AlternateContent>
-      <mc:AlternateContent xmlns:mc="http://schemas.openxmlformats.org/markup-compatibility/2006">
-        <mc:Choice xmlns:a14="http://schemas.microsoft.com/office/drawing/2010/main" Requires="a14">
+      <mc:AlternateContent xmlns:mc="http://schemas.openxmlformats.org/markup-compatibility/2006" xmlns:a14="http://schemas.microsoft.com/office/drawing/2010/main">
+        <mc:Choice Requires="a14">
           <p:sp>
             <p:nvSpPr>
               <p:cNvPr id="62" name="Rounded Rectangle 61">
@@ -16772,7 +16783,7 @@
             </p:txBody>
           </p:sp>
         </mc:Choice>
-        <mc:Fallback>
+        <mc:Fallback xmlns="">
           <p:sp>
             <p:nvSpPr>
               <p:cNvPr id="62" name="Rounded Rectangle 61">
@@ -16975,8 +16986,8 @@
           </a:fontRef>
         </p:style>
       </p:cxnSp>
-      <mc:AlternateContent xmlns:mc="http://schemas.openxmlformats.org/markup-compatibility/2006">
-        <mc:Choice xmlns:a14="http://schemas.microsoft.com/office/drawing/2010/main" Requires="a14">
+      <mc:AlternateContent xmlns:mc="http://schemas.openxmlformats.org/markup-compatibility/2006" xmlns:a14="http://schemas.microsoft.com/office/drawing/2010/main">
+        <mc:Choice Requires="a14">
           <p:sp>
             <p:nvSpPr>
               <p:cNvPr id="87" name="Rectangle 86">
@@ -17066,7 +17077,7 @@
             </p:txBody>
           </p:sp>
         </mc:Choice>
-        <mc:Fallback>
+        <mc:Fallback xmlns="">
           <p:sp>
             <p:nvSpPr>
               <p:cNvPr id="87" name="Rectangle 86">
@@ -17116,8 +17127,8 @@
           </p:sp>
         </mc:Fallback>
       </mc:AlternateContent>
-      <mc:AlternateContent xmlns:mc="http://schemas.openxmlformats.org/markup-compatibility/2006">
-        <mc:Choice xmlns:a14="http://schemas.microsoft.com/office/drawing/2010/main" Requires="a14">
+      <mc:AlternateContent xmlns:mc="http://schemas.openxmlformats.org/markup-compatibility/2006" xmlns:a14="http://schemas.microsoft.com/office/drawing/2010/main">
+        <mc:Choice Requires="a14">
           <p:sp>
             <p:nvSpPr>
               <p:cNvPr id="90" name="Rectangle 89">
@@ -17218,7 +17229,7 @@
             </p:txBody>
           </p:sp>
         </mc:Choice>
-        <mc:Fallback>
+        <mc:Fallback xmlns="">
           <p:sp>
             <p:nvSpPr>
               <p:cNvPr id="90" name="Rectangle 89">
@@ -17268,8 +17279,8 @@
           </p:sp>
         </mc:Fallback>
       </mc:AlternateContent>
-      <mc:AlternateContent xmlns:mc="http://schemas.openxmlformats.org/markup-compatibility/2006">
-        <mc:Choice xmlns:a14="http://schemas.microsoft.com/office/drawing/2010/main" Requires="a14">
+      <mc:AlternateContent xmlns:mc="http://schemas.openxmlformats.org/markup-compatibility/2006" xmlns:a14="http://schemas.microsoft.com/office/drawing/2010/main">
+        <mc:Choice Requires="a14">
           <p:sp>
             <p:nvSpPr>
               <p:cNvPr id="91" name="Rectangle 90">
@@ -17370,7 +17381,7 @@
             </p:txBody>
           </p:sp>
         </mc:Choice>
-        <mc:Fallback>
+        <mc:Fallback xmlns="">
           <p:sp>
             <p:nvSpPr>
               <p:cNvPr id="91" name="Rectangle 90">
@@ -17420,8 +17431,8 @@
           </p:sp>
         </mc:Fallback>
       </mc:AlternateContent>
-      <mc:AlternateContent xmlns:mc="http://schemas.openxmlformats.org/markup-compatibility/2006">
-        <mc:Choice xmlns:a14="http://schemas.microsoft.com/office/drawing/2010/main" Requires="a14">
+      <mc:AlternateContent xmlns:mc="http://schemas.openxmlformats.org/markup-compatibility/2006" xmlns:a14="http://schemas.microsoft.com/office/drawing/2010/main">
+        <mc:Choice Requires="a14">
           <p:sp>
             <p:nvSpPr>
               <p:cNvPr id="92" name="Rectangle 91">
@@ -17501,7 +17512,7 @@
             </p:txBody>
           </p:sp>
         </mc:Choice>
-        <mc:Fallback>
+        <mc:Fallback xmlns="">
           <p:sp>
             <p:nvSpPr>
               <p:cNvPr id="92" name="Rectangle 91">
@@ -17551,8 +17562,8 @@
           </p:sp>
         </mc:Fallback>
       </mc:AlternateContent>
-      <mc:AlternateContent xmlns:mc="http://schemas.openxmlformats.org/markup-compatibility/2006">
-        <mc:Choice xmlns:a14="http://schemas.microsoft.com/office/drawing/2010/main" Requires="a14">
+      <mc:AlternateContent xmlns:mc="http://schemas.openxmlformats.org/markup-compatibility/2006" xmlns:a14="http://schemas.microsoft.com/office/drawing/2010/main">
+        <mc:Choice Requires="a14">
           <p:sp>
             <p:nvSpPr>
               <p:cNvPr id="93" name="Rectangle 92">
@@ -17662,7 +17673,7 @@
             </p:txBody>
           </p:sp>
         </mc:Choice>
-        <mc:Fallback>
+        <mc:Fallback xmlns="">
           <p:sp>
             <p:nvSpPr>
               <p:cNvPr id="93" name="Rectangle 92">
@@ -17712,8 +17723,8 @@
           </p:sp>
         </mc:Fallback>
       </mc:AlternateContent>
-      <mc:AlternateContent xmlns:mc="http://schemas.openxmlformats.org/markup-compatibility/2006">
-        <mc:Choice xmlns:a14="http://schemas.microsoft.com/office/drawing/2010/main" Requires="a14">
+      <mc:AlternateContent xmlns:mc="http://schemas.openxmlformats.org/markup-compatibility/2006" xmlns:a14="http://schemas.microsoft.com/office/drawing/2010/main">
+        <mc:Choice Requires="a14">
           <p:sp>
             <p:nvSpPr>
               <p:cNvPr id="94" name="Rectangle 93">
@@ -17814,7 +17825,7 @@
             </p:txBody>
           </p:sp>
         </mc:Choice>
-        <mc:Fallback>
+        <mc:Fallback xmlns="">
           <p:sp>
             <p:nvSpPr>
               <p:cNvPr id="94" name="Rectangle 93">
@@ -17908,8 +17919,8 @@
           </a:fontRef>
         </p:style>
       </p:cxnSp>
-      <mc:AlternateContent xmlns:mc="http://schemas.openxmlformats.org/markup-compatibility/2006">
-        <mc:Choice xmlns:a14="http://schemas.microsoft.com/office/drawing/2010/main" Requires="a14">
+      <mc:AlternateContent xmlns:mc="http://schemas.openxmlformats.org/markup-compatibility/2006" xmlns:a14="http://schemas.microsoft.com/office/drawing/2010/main">
+        <mc:Choice Requires="a14">
           <p:sp>
             <p:nvSpPr>
               <p:cNvPr id="104" name="Rounded Rectangle 103">
@@ -17992,7 +18003,7 @@
             </p:txBody>
           </p:sp>
         </mc:Choice>
-        <mc:Fallback>
+        <mc:Fallback xmlns="">
           <p:sp>
             <p:nvSpPr>
               <p:cNvPr id="104" name="Rounded Rectangle 103">
@@ -18130,8 +18141,8 @@
           </a:fontRef>
         </p:style>
       </p:cxnSp>
-      <mc:AlternateContent xmlns:mc="http://schemas.openxmlformats.org/markup-compatibility/2006">
-        <mc:Choice xmlns:a14="http://schemas.microsoft.com/office/drawing/2010/main" Requires="a14">
+      <mc:AlternateContent xmlns:mc="http://schemas.openxmlformats.org/markup-compatibility/2006" xmlns:a14="http://schemas.microsoft.com/office/drawing/2010/main">
+        <mc:Choice Requires="a14">
           <p:sp>
             <p:nvSpPr>
               <p:cNvPr id="135" name="TextBox 134">
@@ -18201,7 +18212,7 @@
             </p:txBody>
           </p:sp>
         </mc:Choice>
-        <mc:Fallback>
+        <mc:Fallback xmlns="">
           <p:sp>
             <p:nvSpPr>
               <p:cNvPr id="135" name="TextBox 134">
@@ -18368,8 +18379,8 @@
           </a:p>
         </p:txBody>
       </p:sp>
-      <mc:AlternateContent xmlns:mc="http://schemas.openxmlformats.org/markup-compatibility/2006">
-        <mc:Choice xmlns:a14="http://schemas.microsoft.com/office/drawing/2010/main" Requires="a14">
+      <mc:AlternateContent xmlns:mc="http://schemas.openxmlformats.org/markup-compatibility/2006" xmlns:a14="http://schemas.microsoft.com/office/drawing/2010/main">
+        <mc:Choice Requires="a14">
           <p:sp>
             <p:nvSpPr>
               <p:cNvPr id="44" name="Rectangle 43">
@@ -18471,7 +18482,7 @@
             </p:txBody>
           </p:sp>
         </mc:Choice>
-        <mc:Fallback>
+        <mc:Fallback xmlns="">
           <p:sp>
             <p:nvSpPr>
               <p:cNvPr id="44" name="Rectangle 43">
@@ -18521,8 +18532,8 @@
           </p:sp>
         </mc:Fallback>
       </mc:AlternateContent>
-      <mc:AlternateContent xmlns:mc="http://schemas.openxmlformats.org/markup-compatibility/2006">
-        <mc:Choice xmlns:a14="http://schemas.microsoft.com/office/drawing/2010/main" Requires="a14">
+      <mc:AlternateContent xmlns:mc="http://schemas.openxmlformats.org/markup-compatibility/2006" xmlns:a14="http://schemas.microsoft.com/office/drawing/2010/main">
+        <mc:Choice Requires="a14">
           <p:sp>
             <p:nvSpPr>
               <p:cNvPr id="45" name="Rectangle 44">
@@ -18624,7 +18635,7 @@
             </p:txBody>
           </p:sp>
         </mc:Choice>
-        <mc:Fallback>
+        <mc:Fallback xmlns="">
           <p:sp>
             <p:nvSpPr>
               <p:cNvPr id="45" name="Rectangle 44">
@@ -18674,8 +18685,8 @@
           </p:sp>
         </mc:Fallback>
       </mc:AlternateContent>
-      <mc:AlternateContent xmlns:mc="http://schemas.openxmlformats.org/markup-compatibility/2006">
-        <mc:Choice xmlns:a14="http://schemas.microsoft.com/office/drawing/2010/main" Requires="a14">
+      <mc:AlternateContent xmlns:mc="http://schemas.openxmlformats.org/markup-compatibility/2006" xmlns:a14="http://schemas.microsoft.com/office/drawing/2010/main">
+        <mc:Choice Requires="a14">
           <p:sp>
             <p:nvSpPr>
               <p:cNvPr id="46" name="Rectangle 45">
@@ -18757,7 +18768,7 @@
             </p:txBody>
           </p:sp>
         </mc:Choice>
-        <mc:Fallback>
+        <mc:Fallback xmlns="">
           <p:sp>
             <p:nvSpPr>
               <p:cNvPr id="46" name="Rectangle 45">
@@ -18808,8 +18819,8 @@
           </p:sp>
         </mc:Fallback>
       </mc:AlternateContent>
-      <mc:AlternateContent xmlns:mc="http://schemas.openxmlformats.org/markup-compatibility/2006">
-        <mc:Choice xmlns:a14="http://schemas.microsoft.com/office/drawing/2010/main" Requires="a14">
+      <mc:AlternateContent xmlns:mc="http://schemas.openxmlformats.org/markup-compatibility/2006" xmlns:a14="http://schemas.microsoft.com/office/drawing/2010/main">
+        <mc:Choice Requires="a14">
           <p:sp>
             <p:nvSpPr>
               <p:cNvPr id="47" name="Rectangle 46">
@@ -18920,7 +18931,7 @@
             </p:txBody>
           </p:sp>
         </mc:Choice>
-        <mc:Fallback>
+        <mc:Fallback xmlns="">
           <p:sp>
             <p:nvSpPr>
               <p:cNvPr id="47" name="Rectangle 46">
@@ -18971,8 +18982,8 @@
           </p:sp>
         </mc:Fallback>
       </mc:AlternateContent>
-      <mc:AlternateContent xmlns:mc="http://schemas.openxmlformats.org/markup-compatibility/2006">
-        <mc:Choice xmlns:a14="http://schemas.microsoft.com/office/drawing/2010/main" Requires="a14">
+      <mc:AlternateContent xmlns:mc="http://schemas.openxmlformats.org/markup-compatibility/2006" xmlns:a14="http://schemas.microsoft.com/office/drawing/2010/main">
+        <mc:Choice Requires="a14">
           <p:sp>
             <p:nvSpPr>
               <p:cNvPr id="48" name="Rectangle 47">
@@ -19074,7 +19085,7 @@
             </p:txBody>
           </p:sp>
         </mc:Choice>
-        <mc:Fallback>
+        <mc:Fallback xmlns="">
           <p:sp>
             <p:nvSpPr>
               <p:cNvPr id="48" name="Rectangle 47">
@@ -19673,8 +19684,8 @@
           </a:p>
         </p:txBody>
       </p:sp>
-      <mc:AlternateContent xmlns:mc="http://schemas.openxmlformats.org/markup-compatibility/2006">
-        <mc:Choice xmlns:a14="http://schemas.microsoft.com/office/drawing/2010/main" Requires="a14">
+      <mc:AlternateContent xmlns:mc="http://schemas.openxmlformats.org/markup-compatibility/2006" xmlns:a14="http://schemas.microsoft.com/office/drawing/2010/main">
+        <mc:Choice Requires="a14">
           <p:sp>
             <p:nvSpPr>
               <p:cNvPr id="43" name="Rectangle 42">
@@ -19745,7 +19756,7 @@
             </p:txBody>
           </p:sp>
         </mc:Choice>
-        <mc:Fallback>
+        <mc:Fallback xmlns="">
           <p:sp>
             <p:nvSpPr>
               <p:cNvPr id="43" name="Rectangle 42">
@@ -19905,8 +19916,8 @@
           </a:p>
         </p:txBody>
       </p:sp>
-      <mc:AlternateContent xmlns:mc="http://schemas.openxmlformats.org/markup-compatibility/2006">
-        <mc:Choice xmlns:a14="http://schemas.microsoft.com/office/drawing/2010/main" Requires="a14">
+      <mc:AlternateContent xmlns:mc="http://schemas.openxmlformats.org/markup-compatibility/2006" xmlns:a14="http://schemas.microsoft.com/office/drawing/2010/main">
+        <mc:Choice Requires="a14">
           <p:sp>
             <p:nvSpPr>
               <p:cNvPr id="46" name="Rectangle 45">
@@ -19985,7 +19996,7 @@
             </p:txBody>
           </p:sp>
         </mc:Choice>
-        <mc:Fallback>
+        <mc:Fallback xmlns="">
           <p:sp>
             <p:nvSpPr>
               <p:cNvPr id="46" name="Rectangle 45">
@@ -20357,8 +20368,8 @@
           </a:solidFill>
         </p:spPr>
       </p:pic>
-      <mc:AlternateContent xmlns:mc="http://schemas.openxmlformats.org/markup-compatibility/2006">
-        <mc:Choice xmlns:a14="http://schemas.microsoft.com/office/drawing/2010/main" Requires="a14">
+      <mc:AlternateContent xmlns:mc="http://schemas.openxmlformats.org/markup-compatibility/2006" xmlns:a14="http://schemas.microsoft.com/office/drawing/2010/main">
+        <mc:Choice Requires="a14">
           <p:sp>
             <p:nvSpPr>
               <p:cNvPr id="54" name="TextBox 53">
@@ -20387,6 +20398,7 @@
               </a:bodyPr>
               <a:lstStyle/>
               <a:p>
+                <a:pPr/>
                 <a14:m>
                   <m:oMathPara xmlns:m="http://schemas.openxmlformats.org/officeDocument/2006/math">
                     <m:oMathParaPr>
@@ -20425,7 +20437,7 @@
             </p:txBody>
           </p:sp>
         </mc:Choice>
-        <mc:Fallback>
+        <mc:Fallback xmlns="">
           <p:sp>
             <p:nvSpPr>
               <p:cNvPr id="54" name="TextBox 53">
@@ -20536,8 +20548,8 @@
           </a:p>
         </p:txBody>
       </p:sp>
-      <mc:AlternateContent xmlns:mc="http://schemas.openxmlformats.org/markup-compatibility/2006">
-        <mc:Choice xmlns:a14="http://schemas.microsoft.com/office/drawing/2010/main" Requires="a14">
+      <mc:AlternateContent xmlns:mc="http://schemas.openxmlformats.org/markup-compatibility/2006" xmlns:a14="http://schemas.microsoft.com/office/drawing/2010/main">
+        <mc:Choice Requires="a14">
           <p:sp>
             <p:nvSpPr>
               <p:cNvPr id="56" name="Rectangle 55">
@@ -20639,7 +20651,7 @@
             </p:txBody>
           </p:sp>
         </mc:Choice>
-        <mc:Fallback>
+        <mc:Fallback xmlns="">
           <p:sp>
             <p:nvSpPr>
               <p:cNvPr id="56" name="Rectangle 55">
@@ -20689,8 +20701,8 @@
           </p:sp>
         </mc:Fallback>
       </mc:AlternateContent>
-      <mc:AlternateContent xmlns:mc="http://schemas.openxmlformats.org/markup-compatibility/2006">
-        <mc:Choice xmlns:a14="http://schemas.microsoft.com/office/drawing/2010/main" Requires="a14">
+      <mc:AlternateContent xmlns:mc="http://schemas.openxmlformats.org/markup-compatibility/2006" xmlns:a14="http://schemas.microsoft.com/office/drawing/2010/main">
+        <mc:Choice Requires="a14">
           <p:sp>
             <p:nvSpPr>
               <p:cNvPr id="58" name="Rectangle 57">
@@ -20792,7 +20804,7 @@
             </p:txBody>
           </p:sp>
         </mc:Choice>
-        <mc:Fallback>
+        <mc:Fallback xmlns="">
           <p:sp>
             <p:nvSpPr>
               <p:cNvPr id="58" name="Rectangle 57">
@@ -20842,8 +20854,8 @@
           </p:sp>
         </mc:Fallback>
       </mc:AlternateContent>
-      <mc:AlternateContent xmlns:mc="http://schemas.openxmlformats.org/markup-compatibility/2006">
-        <mc:Choice xmlns:a14="http://schemas.microsoft.com/office/drawing/2010/main" Requires="a14">
+      <mc:AlternateContent xmlns:mc="http://schemas.openxmlformats.org/markup-compatibility/2006" xmlns:a14="http://schemas.microsoft.com/office/drawing/2010/main">
+        <mc:Choice Requires="a14">
           <p:sp>
             <p:nvSpPr>
               <p:cNvPr id="60" name="Rectangle 59">
@@ -20924,7 +20936,7 @@
             </p:txBody>
           </p:sp>
         </mc:Choice>
-        <mc:Fallback>
+        <mc:Fallback xmlns="">
           <p:sp>
             <p:nvSpPr>
               <p:cNvPr id="60" name="Rectangle 59">
@@ -20974,8 +20986,8 @@
           </p:sp>
         </mc:Fallback>
       </mc:AlternateContent>
-      <mc:AlternateContent xmlns:mc="http://schemas.openxmlformats.org/markup-compatibility/2006">
-        <mc:Choice xmlns:a14="http://schemas.microsoft.com/office/drawing/2010/main" Requires="a14">
+      <mc:AlternateContent xmlns:mc="http://schemas.openxmlformats.org/markup-compatibility/2006" xmlns:a14="http://schemas.microsoft.com/office/drawing/2010/main">
+        <mc:Choice Requires="a14">
           <p:sp>
             <p:nvSpPr>
               <p:cNvPr id="65" name="Rectangle 64">
@@ -21085,7 +21097,7 @@
             </p:txBody>
           </p:sp>
         </mc:Choice>
-        <mc:Fallback>
+        <mc:Fallback xmlns="">
           <p:sp>
             <p:nvSpPr>
               <p:cNvPr id="65" name="Rectangle 64">
@@ -21135,8 +21147,8 @@
           </p:sp>
         </mc:Fallback>
       </mc:AlternateContent>
-      <mc:AlternateContent xmlns:mc="http://schemas.openxmlformats.org/markup-compatibility/2006">
-        <mc:Choice xmlns:a14="http://schemas.microsoft.com/office/drawing/2010/main" Requires="a14">
+      <mc:AlternateContent xmlns:mc="http://schemas.openxmlformats.org/markup-compatibility/2006" xmlns:a14="http://schemas.microsoft.com/office/drawing/2010/main">
+        <mc:Choice Requires="a14">
           <p:sp>
             <p:nvSpPr>
               <p:cNvPr id="67" name="Rectangle 66">
@@ -21237,7 +21249,7 @@
             </p:txBody>
           </p:sp>
         </mc:Choice>
-        <mc:Fallback>
+        <mc:Fallback xmlns="">
           <p:sp>
             <p:nvSpPr>
               <p:cNvPr id="67" name="Rectangle 66">
@@ -21287,8 +21299,8 @@
           </p:sp>
         </mc:Fallback>
       </mc:AlternateContent>
-      <mc:AlternateContent xmlns:mc="http://schemas.openxmlformats.org/markup-compatibility/2006">
-        <mc:Choice xmlns:a14="http://schemas.microsoft.com/office/drawing/2010/main" Requires="a14">
+      <mc:AlternateContent xmlns:mc="http://schemas.openxmlformats.org/markup-compatibility/2006" xmlns:a14="http://schemas.microsoft.com/office/drawing/2010/main">
+        <mc:Choice Requires="a14">
           <p:sp>
             <p:nvSpPr>
               <p:cNvPr id="85" name="Rectangle 84">
@@ -21378,7 +21390,7 @@
             </p:txBody>
           </p:sp>
         </mc:Choice>
-        <mc:Fallback>
+        <mc:Fallback xmlns="">
           <p:sp>
             <p:nvSpPr>
               <p:cNvPr id="85" name="Rectangle 84">
@@ -21500,8 +21512,8 @@
           </a:p>
         </p:txBody>
       </p:sp>
-      <mc:AlternateContent xmlns:mc="http://schemas.openxmlformats.org/markup-compatibility/2006">
-        <mc:Choice xmlns:a14="http://schemas.microsoft.com/office/drawing/2010/main" Requires="a14">
+      <mc:AlternateContent xmlns:mc="http://schemas.openxmlformats.org/markup-compatibility/2006" xmlns:a14="http://schemas.microsoft.com/office/drawing/2010/main">
+        <mc:Choice Requires="a14">
           <p:sp>
             <p:nvSpPr>
               <p:cNvPr id="89" name="Rounded Rectangle 88">
@@ -21584,7 +21596,7 @@
             </p:txBody>
           </p:sp>
         </mc:Choice>
-        <mc:Fallback>
+        <mc:Fallback xmlns="">
           <p:sp>
             <p:nvSpPr>
               <p:cNvPr id="89" name="Rounded Rectangle 88">
@@ -21817,8 +21829,8 @@
           </a:solidFill>
         </p:spPr>
       </p:pic>
-      <mc:AlternateContent xmlns:mc="http://schemas.openxmlformats.org/markup-compatibility/2006">
-        <mc:Choice xmlns:a14="http://schemas.microsoft.com/office/drawing/2010/main" Requires="a14">
+      <mc:AlternateContent xmlns:mc="http://schemas.openxmlformats.org/markup-compatibility/2006" xmlns:a14="http://schemas.microsoft.com/office/drawing/2010/main">
+        <mc:Choice Requires="a14">
           <p:sp>
             <p:nvSpPr>
               <p:cNvPr id="101" name="Rectangle 100">
@@ -21919,7 +21931,7 @@
             </p:txBody>
           </p:sp>
         </mc:Choice>
-        <mc:Fallback>
+        <mc:Fallback xmlns="">
           <p:sp>
             <p:nvSpPr>
               <p:cNvPr id="101" name="Rectangle 100">
@@ -21969,8 +21981,8 @@
           </p:sp>
         </mc:Fallback>
       </mc:AlternateContent>
-      <mc:AlternateContent xmlns:mc="http://schemas.openxmlformats.org/markup-compatibility/2006">
-        <mc:Choice xmlns:a14="http://schemas.microsoft.com/office/drawing/2010/main" Requires="a14">
+      <mc:AlternateContent xmlns:mc="http://schemas.openxmlformats.org/markup-compatibility/2006" xmlns:a14="http://schemas.microsoft.com/office/drawing/2010/main">
+        <mc:Choice Requires="a14">
           <p:sp>
             <p:nvSpPr>
               <p:cNvPr id="102" name="Rectangle 101">
@@ -22071,7 +22083,7 @@
             </p:txBody>
           </p:sp>
         </mc:Choice>
-        <mc:Fallback>
+        <mc:Fallback xmlns="">
           <p:sp>
             <p:nvSpPr>
               <p:cNvPr id="102" name="Rectangle 101">
@@ -22121,8 +22133,8 @@
           </p:sp>
         </mc:Fallback>
       </mc:AlternateContent>
-      <mc:AlternateContent xmlns:mc="http://schemas.openxmlformats.org/markup-compatibility/2006">
-        <mc:Choice xmlns:a14="http://schemas.microsoft.com/office/drawing/2010/main" Requires="a14">
+      <mc:AlternateContent xmlns:mc="http://schemas.openxmlformats.org/markup-compatibility/2006" xmlns:a14="http://schemas.microsoft.com/office/drawing/2010/main">
+        <mc:Choice Requires="a14">
           <p:sp>
             <p:nvSpPr>
               <p:cNvPr id="103" name="Rectangle 102">
@@ -22202,7 +22214,7 @@
             </p:txBody>
           </p:sp>
         </mc:Choice>
-        <mc:Fallback>
+        <mc:Fallback xmlns="">
           <p:sp>
             <p:nvSpPr>
               <p:cNvPr id="103" name="Rectangle 102">
@@ -22252,8 +22264,8 @@
           </p:sp>
         </mc:Fallback>
       </mc:AlternateContent>
-      <mc:AlternateContent xmlns:mc="http://schemas.openxmlformats.org/markup-compatibility/2006">
-        <mc:Choice xmlns:a14="http://schemas.microsoft.com/office/drawing/2010/main" Requires="a14">
+      <mc:AlternateContent xmlns:mc="http://schemas.openxmlformats.org/markup-compatibility/2006" xmlns:a14="http://schemas.microsoft.com/office/drawing/2010/main">
+        <mc:Choice Requires="a14">
           <p:sp>
             <p:nvSpPr>
               <p:cNvPr id="104" name="Rectangle 103">
@@ -22363,7 +22375,7 @@
             </p:txBody>
           </p:sp>
         </mc:Choice>
-        <mc:Fallback>
+        <mc:Fallback xmlns="">
           <p:sp>
             <p:nvSpPr>
               <p:cNvPr id="104" name="Rectangle 103">
@@ -22413,8 +22425,8 @@
           </p:sp>
         </mc:Fallback>
       </mc:AlternateContent>
-      <mc:AlternateContent xmlns:mc="http://schemas.openxmlformats.org/markup-compatibility/2006">
-        <mc:Choice xmlns:a14="http://schemas.microsoft.com/office/drawing/2010/main" Requires="a14">
+      <mc:AlternateContent xmlns:mc="http://schemas.openxmlformats.org/markup-compatibility/2006" xmlns:a14="http://schemas.microsoft.com/office/drawing/2010/main">
+        <mc:Choice Requires="a14">
           <p:sp>
             <p:nvSpPr>
               <p:cNvPr id="105" name="Rectangle 104">
@@ -22515,7 +22527,7 @@
             </p:txBody>
           </p:sp>
         </mc:Choice>
-        <mc:Fallback>
+        <mc:Fallback xmlns="">
           <p:sp>
             <p:nvSpPr>
               <p:cNvPr id="105" name="Rectangle 104">
@@ -22795,8 +22807,8 @@
           </a:fontRef>
         </p:style>
       </p:cxnSp>
-      <mc:AlternateContent xmlns:mc="http://schemas.openxmlformats.org/markup-compatibility/2006">
-        <mc:Choice xmlns:a14="http://schemas.microsoft.com/office/drawing/2010/main" Requires="a14">
+      <mc:AlternateContent xmlns:mc="http://schemas.openxmlformats.org/markup-compatibility/2006" xmlns:a14="http://schemas.microsoft.com/office/drawing/2010/main">
+        <mc:Choice Requires="a14">
           <p:sp>
             <p:nvSpPr>
               <p:cNvPr id="39" name="Rectangle 38">
@@ -22898,7 +22910,7 @@
             </p:txBody>
           </p:sp>
         </mc:Choice>
-        <mc:Fallback>
+        <mc:Fallback xmlns="">
           <p:sp>
             <p:nvSpPr>
               <p:cNvPr id="39" name="Rectangle 38">
@@ -22948,8 +22960,8 @@
           </p:sp>
         </mc:Fallback>
       </mc:AlternateContent>
-      <mc:AlternateContent xmlns:mc="http://schemas.openxmlformats.org/markup-compatibility/2006">
-        <mc:Choice xmlns:a14="http://schemas.microsoft.com/office/drawing/2010/main" Requires="a14">
+      <mc:AlternateContent xmlns:mc="http://schemas.openxmlformats.org/markup-compatibility/2006" xmlns:a14="http://schemas.microsoft.com/office/drawing/2010/main">
+        <mc:Choice Requires="a14">
           <p:sp>
             <p:nvSpPr>
               <p:cNvPr id="40" name="Rectangle 39">
@@ -23051,7 +23063,7 @@
             </p:txBody>
           </p:sp>
         </mc:Choice>
-        <mc:Fallback>
+        <mc:Fallback xmlns="">
           <p:sp>
             <p:nvSpPr>
               <p:cNvPr id="40" name="Rectangle 39">
@@ -23101,8 +23113,8 @@
           </p:sp>
         </mc:Fallback>
       </mc:AlternateContent>
-      <mc:AlternateContent xmlns:mc="http://schemas.openxmlformats.org/markup-compatibility/2006">
-        <mc:Choice xmlns:a14="http://schemas.microsoft.com/office/drawing/2010/main" Requires="a14">
+      <mc:AlternateContent xmlns:mc="http://schemas.openxmlformats.org/markup-compatibility/2006" xmlns:a14="http://schemas.microsoft.com/office/drawing/2010/main">
+        <mc:Choice Requires="a14">
           <p:sp>
             <p:nvSpPr>
               <p:cNvPr id="49" name="Rectangle 48">
@@ -23184,7 +23196,7 @@
             </p:txBody>
           </p:sp>
         </mc:Choice>
-        <mc:Fallback>
+        <mc:Fallback xmlns="">
           <p:sp>
             <p:nvSpPr>
               <p:cNvPr id="49" name="Rectangle 48">
@@ -23235,8 +23247,8 @@
           </p:sp>
         </mc:Fallback>
       </mc:AlternateContent>
-      <mc:AlternateContent xmlns:mc="http://schemas.openxmlformats.org/markup-compatibility/2006">
-        <mc:Choice xmlns:a14="http://schemas.microsoft.com/office/drawing/2010/main" Requires="a14">
+      <mc:AlternateContent xmlns:mc="http://schemas.openxmlformats.org/markup-compatibility/2006" xmlns:a14="http://schemas.microsoft.com/office/drawing/2010/main">
+        <mc:Choice Requires="a14">
           <p:sp>
             <p:nvSpPr>
               <p:cNvPr id="57" name="Rectangle 56">
@@ -23347,7 +23359,7 @@
             </p:txBody>
           </p:sp>
         </mc:Choice>
-        <mc:Fallback>
+        <mc:Fallback xmlns="">
           <p:sp>
             <p:nvSpPr>
               <p:cNvPr id="57" name="Rectangle 56">
@@ -23398,8 +23410,8 @@
           </p:sp>
         </mc:Fallback>
       </mc:AlternateContent>
-      <mc:AlternateContent xmlns:mc="http://schemas.openxmlformats.org/markup-compatibility/2006">
-        <mc:Choice xmlns:a14="http://schemas.microsoft.com/office/drawing/2010/main" Requires="a14">
+      <mc:AlternateContent xmlns:mc="http://schemas.openxmlformats.org/markup-compatibility/2006" xmlns:a14="http://schemas.microsoft.com/office/drawing/2010/main">
+        <mc:Choice Requires="a14">
           <p:sp>
             <p:nvSpPr>
               <p:cNvPr id="59" name="Rectangle 58">
@@ -23501,7 +23513,7 @@
             </p:txBody>
           </p:sp>
         </mc:Choice>
-        <mc:Fallback>
+        <mc:Fallback xmlns="">
           <p:sp>
             <p:nvSpPr>
               <p:cNvPr id="59" name="Rectangle 58">
@@ -23652,8 +23664,8 @@
           </a:p>
         </p:txBody>
       </p:sp>
-      <mc:AlternateContent xmlns:mc="http://schemas.openxmlformats.org/markup-compatibility/2006">
-        <mc:Choice xmlns:a14="http://schemas.microsoft.com/office/drawing/2010/main" Requires="a14">
+      <mc:AlternateContent xmlns:mc="http://schemas.openxmlformats.org/markup-compatibility/2006" xmlns:a14="http://schemas.microsoft.com/office/drawing/2010/main">
+        <mc:Choice Requires="a14">
           <p:sp>
             <p:nvSpPr>
               <p:cNvPr id="64" name="Rounded Rectangle 63">
@@ -23748,7 +23760,7 @@
             </p:txBody>
           </p:sp>
         </mc:Choice>
-        <mc:Fallback>
+        <mc:Fallback xmlns="">
           <p:sp>
             <p:nvSpPr>
               <p:cNvPr id="64" name="Rounded Rectangle 63">
@@ -24532,8 +24544,8 @@
           </a:p>
         </p:txBody>
       </p:sp>
-      <mc:AlternateContent xmlns:mc="http://schemas.openxmlformats.org/markup-compatibility/2006">
-        <mc:Choice xmlns:a14="http://schemas.microsoft.com/office/drawing/2010/main" Requires="a14">
+      <mc:AlternateContent xmlns:mc="http://schemas.openxmlformats.org/markup-compatibility/2006" xmlns:a14="http://schemas.microsoft.com/office/drawing/2010/main">
+        <mc:Choice Requires="a14">
           <p:sp>
             <p:nvSpPr>
               <p:cNvPr id="120" name="TextBox 119">
@@ -24673,7 +24685,7 @@
             </p:txBody>
           </p:sp>
         </mc:Choice>
-        <mc:Fallback>
+        <mc:Fallback xmlns="">
           <p:sp>
             <p:nvSpPr>
               <p:cNvPr id="120" name="TextBox 119">
@@ -24844,7 +24856,7 @@
             <p:spPr>
               <a:xfrm>
                 <a:off x="2369696" y="2792815"/>
-                <a:ext cx="2978316" cy="375552"/>
+                <a:ext cx="3080715" cy="375552"/>
               </a:xfrm>
               <a:prstGeom prst="rect">
                 <a:avLst/>
@@ -24914,12 +24926,31 @@
                       </a:rPr>
                       <m:t>|</m:t>
                     </m:r>
-                    <m:r>
-                      <a:rPr lang="en-US" b="1" i="1" smtClean="0">
-                        <a:latin typeface="Cambria Math" panose="02040503050406030204" pitchFamily="18" charset="0"/>
-                      </a:rPr>
-                      <m:t>𝒛</m:t>
-                    </m:r>
+                    <m:sSup>
+                      <m:sSupPr>
+                        <m:ctrlPr>
+                          <a:rPr lang="en-US" b="0" i="1" smtClean="0">
+                            <a:latin typeface="Cambria Math" panose="02040503050406030204" pitchFamily="18" charset="0"/>
+                          </a:rPr>
+                        </m:ctrlPr>
+                      </m:sSupPr>
+                      <m:e>
+                        <m:r>
+                          <a:rPr lang="en-US" b="1" i="1" smtClean="0">
+                            <a:latin typeface="Cambria Math" panose="02040503050406030204" pitchFamily="18" charset="0"/>
+                          </a:rPr>
+                          <m:t>𝒛</m:t>
+                        </m:r>
+                      </m:e>
+                      <m:sup>
+                        <m:r>
+                          <a:rPr lang="en-US" b="0" i="1" smtClean="0">
+                            <a:latin typeface="Cambria Math" panose="02040503050406030204" pitchFamily="18" charset="0"/>
+                          </a:rPr>
+                          <m:t>1</m:t>
+                        </m:r>
+                      </m:sup>
+                    </m:sSup>
                     <m:r>
                       <a:rPr lang="en-US" b="0" i="1" smtClean="0">
                         <a:latin typeface="Cambria Math" panose="02040503050406030204" pitchFamily="18" charset="0"/>
@@ -24951,7 +24982,7 @@
             <p:spPr>
               <a:xfrm>
                 <a:off x="2369696" y="2792815"/>
-                <a:ext cx="2978316" cy="375552"/>
+                <a:ext cx="3080715" cy="375552"/>
               </a:xfrm>
               <a:prstGeom prst="rect">
                 <a:avLst/>
@@ -24959,7 +24990,7 @@
               <a:blipFill>
                 <a:blip r:embed="rId3"/>
                 <a:stretch>
-                  <a:fillRect l="-1702" t="-6452" b="-22581"/>
+                  <a:fillRect l="-1639" t="-6452" b="-22581"/>
                 </a:stretch>
               </a:blipFill>
             </p:spPr>
@@ -25087,8 +25118,8 @@
           </a:p>
         </p:txBody>
       </p:sp>
-      <mc:AlternateContent xmlns:mc="http://schemas.openxmlformats.org/markup-compatibility/2006">
-        <mc:Choice xmlns:a14="http://schemas.microsoft.com/office/drawing/2010/main" Requires="a14">
+      <mc:AlternateContent xmlns:mc="http://schemas.openxmlformats.org/markup-compatibility/2006" xmlns:a14="http://schemas.microsoft.com/office/drawing/2010/main">
+        <mc:Choice Requires="a14">
           <p:sp>
             <p:nvSpPr>
               <p:cNvPr id="126" name="TextBox 125">
@@ -25181,7 +25212,7 @@
             </p:txBody>
           </p:sp>
         </mc:Choice>
-        <mc:Fallback>
+        <mc:Fallback xmlns="">
           <p:sp>
             <p:nvSpPr>
               <p:cNvPr id="126" name="TextBox 125">
@@ -25471,7 +25502,7 @@
                     <m:d>
                       <m:dPr>
                         <m:ctrlPr>
-                          <a:rPr lang="en-US" i="1" smtClean="0">
+                          <a:rPr lang="en-US" b="1" i="1" smtClean="0">
                             <a:latin typeface="Cambria Math" panose="02040503050406030204" pitchFamily="18" charset="0"/>
                           </a:rPr>
                         </m:ctrlPr>
@@ -25514,7 +25545,7 @@
                     </m:d>
                   </m:oMath>
                 </a14:m>
-                <a:endParaRPr lang="en-US" dirty="0"/>
+                <a:endParaRPr lang="en-US" b="1" dirty="0"/>
               </a:p>
               <a:p>
                 <a:pPr algn="ctr"/>
@@ -25758,7 +25789,7 @@
             <p:spPr>
               <a:xfrm>
                 <a:off x="2369696" y="5040987"/>
-                <a:ext cx="2978316" cy="375552"/>
+                <a:ext cx="3088859" cy="375552"/>
               </a:xfrm>
               <a:prstGeom prst="rect">
                 <a:avLst/>
@@ -25828,12 +25859,31 @@
                       </a:rPr>
                       <m:t>|</m:t>
                     </m:r>
-                    <m:r>
-                      <a:rPr lang="en-US" b="1" i="1">
-                        <a:latin typeface="Cambria Math" panose="02040503050406030204" pitchFamily="18" charset="0"/>
-                      </a:rPr>
-                      <m:t>𝒛</m:t>
-                    </m:r>
+                    <m:sSup>
+                      <m:sSupPr>
+                        <m:ctrlPr>
+                          <a:rPr lang="en-US" b="1" i="1" smtClean="0">
+                            <a:latin typeface="Cambria Math" panose="02040503050406030204" pitchFamily="18" charset="0"/>
+                          </a:rPr>
+                        </m:ctrlPr>
+                      </m:sSupPr>
+                      <m:e>
+                        <m:r>
+                          <a:rPr lang="en-US" b="1" i="1">
+                            <a:latin typeface="Cambria Math" panose="02040503050406030204" pitchFamily="18" charset="0"/>
+                          </a:rPr>
+                          <m:t>𝒛</m:t>
+                        </m:r>
+                      </m:e>
+                      <m:sup>
+                        <m:r>
+                          <a:rPr lang="en-US" b="1" i="1" smtClean="0">
+                            <a:latin typeface="Cambria Math" panose="02040503050406030204" pitchFamily="18" charset="0"/>
+                          </a:rPr>
+                          <m:t>𝟐</m:t>
+                        </m:r>
+                      </m:sup>
+                    </m:sSup>
                     <m:r>
                       <a:rPr lang="en-US" i="1">
                         <a:latin typeface="Cambria Math" panose="02040503050406030204" pitchFamily="18" charset="0"/>
@@ -25865,7 +25915,7 @@
             <p:spPr>
               <a:xfrm>
                 <a:off x="2369696" y="5040987"/>
-                <a:ext cx="2978316" cy="375552"/>
+                <a:ext cx="3088859" cy="375552"/>
               </a:xfrm>
               <a:prstGeom prst="rect">
                 <a:avLst/>
@@ -25873,7 +25923,7 @@
               <a:blipFill>
                 <a:blip r:embed="rId6"/>
                 <a:stretch>
-                  <a:fillRect l="-1702" t="-6452" b="-22581"/>
+                  <a:fillRect l="-1639" t="-6452" b="-22581"/>
                 </a:stretch>
               </a:blipFill>
             </p:spPr>
@@ -26056,8 +26106,8 @@
           </a:p>
         </p:txBody>
       </p:sp>
-      <mc:AlternateContent xmlns:mc="http://schemas.openxmlformats.org/markup-compatibility/2006">
-        <mc:Choice xmlns:a14="http://schemas.microsoft.com/office/drawing/2010/main" Requires="a14">
+      <mc:AlternateContent xmlns:mc="http://schemas.openxmlformats.org/markup-compatibility/2006" xmlns:a14="http://schemas.microsoft.com/office/drawing/2010/main">
+        <mc:Choice Requires="a14">
           <p:sp>
             <p:nvSpPr>
               <p:cNvPr id="155" name="TextBox 154">
@@ -26150,7 +26200,7 @@
             </p:txBody>
           </p:sp>
         </mc:Choice>
-        <mc:Fallback>
+        <mc:Fallback xmlns="">
           <p:sp>
             <p:nvSpPr>
               <p:cNvPr id="155" name="TextBox 154">
@@ -26659,7 +26709,7 @@
             <p:spPr>
               <a:xfrm>
                 <a:off x="8191391" y="5047625"/>
-                <a:ext cx="2987934" cy="375552"/>
+                <a:ext cx="3098477" cy="375552"/>
               </a:xfrm>
               <a:prstGeom prst="rect">
                 <a:avLst/>
@@ -26729,12 +26779,31 @@
                       </a:rPr>
                       <m:t>|</m:t>
                     </m:r>
-                    <m:r>
-                      <a:rPr lang="en-US" b="1" i="1" smtClean="0">
-                        <a:latin typeface="Cambria Math" panose="02040503050406030204" pitchFamily="18" charset="0"/>
-                      </a:rPr>
-                      <m:t>𝒛</m:t>
-                    </m:r>
+                    <m:sSup>
+                      <m:sSupPr>
+                        <m:ctrlPr>
+                          <a:rPr lang="en-US" b="1" i="1" smtClean="0">
+                            <a:latin typeface="Cambria Math" panose="02040503050406030204" pitchFamily="18" charset="0"/>
+                          </a:rPr>
+                        </m:ctrlPr>
+                      </m:sSupPr>
+                      <m:e>
+                        <m:r>
+                          <a:rPr lang="en-US" b="1" i="1" smtClean="0">
+                            <a:latin typeface="Cambria Math" panose="02040503050406030204" pitchFamily="18" charset="0"/>
+                          </a:rPr>
+                          <m:t>𝒛</m:t>
+                        </m:r>
+                      </m:e>
+                      <m:sup>
+                        <m:r>
+                          <a:rPr lang="en-US" b="1" i="1" smtClean="0">
+                            <a:latin typeface="Cambria Math" panose="02040503050406030204" pitchFamily="18" charset="0"/>
+                          </a:rPr>
+                          <m:t>𝟏</m:t>
+                        </m:r>
+                      </m:sup>
+                    </m:sSup>
                     <m:r>
                       <a:rPr lang="en-US" b="0" i="1" smtClean="0">
                         <a:latin typeface="Cambria Math" panose="02040503050406030204" pitchFamily="18" charset="0"/>
@@ -26766,7 +26835,7 @@
             <p:spPr>
               <a:xfrm>
                 <a:off x="8191391" y="5047625"/>
-                <a:ext cx="2987934" cy="375552"/>
+                <a:ext cx="3098477" cy="375552"/>
               </a:xfrm>
               <a:prstGeom prst="rect">
                 <a:avLst/>
@@ -26774,7 +26843,7 @@
               <a:blipFill>
                 <a:blip r:embed="rId8"/>
                 <a:stretch>
-                  <a:fillRect l="-2119" t="-6452" b="-22581"/>
+                  <a:fillRect l="-2049" t="-6452" b="-22581"/>
                 </a:stretch>
               </a:blipFill>
             </p:spPr>
@@ -26902,8 +26971,8 @@
           </a:p>
         </p:txBody>
       </p:sp>
-      <mc:AlternateContent xmlns:mc="http://schemas.openxmlformats.org/markup-compatibility/2006">
-        <mc:Choice xmlns:a14="http://schemas.microsoft.com/office/drawing/2010/main" Requires="a14">
+      <mc:AlternateContent xmlns:mc="http://schemas.openxmlformats.org/markup-compatibility/2006" xmlns:a14="http://schemas.microsoft.com/office/drawing/2010/main">
+        <mc:Choice Requires="a14">
           <p:sp>
             <p:nvSpPr>
               <p:cNvPr id="175" name="TextBox 174">
@@ -26996,7 +27065,7 @@
             </p:txBody>
           </p:sp>
         </mc:Choice>
-        <mc:Fallback>
+        <mc:Fallback xmlns="">
           <p:sp>
             <p:nvSpPr>
               <p:cNvPr id="175" name="TextBox 174">
@@ -27208,8 +27277,8 @@
           </a:p>
         </p:txBody>
       </p:sp>
-      <mc:AlternateContent xmlns:mc="http://schemas.openxmlformats.org/markup-compatibility/2006">
-        <mc:Choice xmlns:a14="http://schemas.microsoft.com/office/drawing/2010/main" Requires="a14">
+      <mc:AlternateContent xmlns:mc="http://schemas.openxmlformats.org/markup-compatibility/2006" xmlns:a14="http://schemas.microsoft.com/office/drawing/2010/main">
+        <mc:Choice Requires="a14">
           <p:sp>
             <p:nvSpPr>
               <p:cNvPr id="179" name="TextBox 178">
@@ -27349,7 +27418,7 @@
             </p:txBody>
           </p:sp>
         </mc:Choice>
-        <mc:Fallback>
+        <mc:Fallback xmlns="">
           <p:sp>
             <p:nvSpPr>
               <p:cNvPr id="179" name="TextBox 178">
@@ -27573,7 +27642,7 @@
             <p:spPr>
               <a:xfrm>
                 <a:off x="8191391" y="2771432"/>
-                <a:ext cx="3002360" cy="375552"/>
+                <a:ext cx="3112903" cy="375552"/>
               </a:xfrm>
               <a:prstGeom prst="rect">
                 <a:avLst/>
@@ -27643,12 +27712,31 @@
                       </a:rPr>
                       <m:t>|</m:t>
                     </m:r>
-                    <m:r>
-                      <a:rPr lang="en-US" b="1" i="1">
-                        <a:latin typeface="Cambria Math" panose="02040503050406030204" pitchFamily="18" charset="0"/>
-                      </a:rPr>
-                      <m:t>𝒛</m:t>
-                    </m:r>
+                    <m:sSup>
+                      <m:sSupPr>
+                        <m:ctrlPr>
+                          <a:rPr lang="en-US" b="1" i="1" smtClean="0">
+                            <a:latin typeface="Cambria Math" panose="02040503050406030204" pitchFamily="18" charset="0"/>
+                          </a:rPr>
+                        </m:ctrlPr>
+                      </m:sSupPr>
+                      <m:e>
+                        <m:r>
+                          <a:rPr lang="en-US" b="1" i="1">
+                            <a:latin typeface="Cambria Math" panose="02040503050406030204" pitchFamily="18" charset="0"/>
+                          </a:rPr>
+                          <m:t>𝒛</m:t>
+                        </m:r>
+                      </m:e>
+                      <m:sup>
+                        <m:r>
+                          <a:rPr lang="en-US" b="1" i="1" smtClean="0">
+                            <a:latin typeface="Cambria Math" panose="02040503050406030204" pitchFamily="18" charset="0"/>
+                          </a:rPr>
+                          <m:t>𝟐</m:t>
+                        </m:r>
+                      </m:sup>
+                    </m:sSup>
                     <m:r>
                       <a:rPr lang="en-US" i="1">
                         <a:latin typeface="Cambria Math" panose="02040503050406030204" pitchFamily="18" charset="0"/>
@@ -27680,7 +27768,7 @@
             <p:spPr>
               <a:xfrm>
                 <a:off x="8191391" y="2771432"/>
-                <a:ext cx="3002360" cy="375552"/>
+                <a:ext cx="3112903" cy="375552"/>
               </a:xfrm>
               <a:prstGeom prst="rect">
                 <a:avLst/>
@@ -27688,7 +27776,7 @@
               <a:blipFill>
                 <a:blip r:embed="rId11"/>
                 <a:stretch>
-                  <a:fillRect l="-2110" t="-6667" b="-23333"/>
+                  <a:fillRect l="-2041" t="-6667" b="-23333"/>
                 </a:stretch>
               </a:blipFill>
             </p:spPr>
@@ -27871,8 +27959,8 @@
           </a:p>
         </p:txBody>
       </p:sp>
-      <mc:AlternateContent xmlns:mc="http://schemas.openxmlformats.org/markup-compatibility/2006">
-        <mc:Choice xmlns:a14="http://schemas.microsoft.com/office/drawing/2010/main" Requires="a14">
+      <mc:AlternateContent xmlns:mc="http://schemas.openxmlformats.org/markup-compatibility/2006" xmlns:a14="http://schemas.microsoft.com/office/drawing/2010/main">
+        <mc:Choice Requires="a14">
           <p:sp>
             <p:nvSpPr>
               <p:cNvPr id="187" name="TextBox 186">
@@ -27965,7 +28053,7 @@
             </p:txBody>
           </p:sp>
         </mc:Choice>
-        <mc:Fallback>
+        <mc:Fallback xmlns="">
           <p:sp>
             <p:nvSpPr>
               <p:cNvPr id="187" name="TextBox 186">
@@ -28356,7 +28444,7 @@
             <p:spPr>
               <a:xfrm>
                 <a:off x="8174386" y="5804627"/>
-                <a:ext cx="3340658" cy="652551"/>
+                <a:ext cx="3361561" cy="681982"/>
               </a:xfrm>
               <a:prstGeom prst="rect">
                 <a:avLst/>
@@ -28434,25 +28522,25 @@
                         <m:sSup>
                           <m:sSupPr>
                             <m:ctrlPr>
-                              <a:rPr lang="en-US" b="0" i="1" smtClean="0">
+                              <a:rPr lang="en-US" b="1" i="1" smtClean="0">
                                 <a:latin typeface="Cambria Math" panose="02040503050406030204" pitchFamily="18" charset="0"/>
                               </a:rPr>
                             </m:ctrlPr>
                           </m:sSupPr>
                           <m:e>
                             <m:r>
-                              <a:rPr lang="en-US" i="1" smtClean="0">
+                              <a:rPr lang="en-US" b="1" i="1" smtClean="0">
                                 <a:latin typeface="Cambria Math" panose="02040503050406030204" pitchFamily="18" charset="0"/>
                               </a:rPr>
-                              <m:t>𝑥</m:t>
+                              <m:t>𝒙</m:t>
                             </m:r>
                           </m:e>
                           <m:sup>
                             <m:r>
-                              <a:rPr lang="en-US" b="0" i="1" smtClean="0">
+                              <a:rPr lang="en-US" b="1" i="1" smtClean="0">
                                 <a:latin typeface="Cambria Math" panose="02040503050406030204" pitchFamily="18" charset="0"/>
                               </a:rPr>
-                              <m:t>1</m:t>
+                              <m:t>𝟏</m:t>
                             </m:r>
                           </m:sup>
                         </m:sSup>
@@ -28498,7 +28586,7 @@
             <p:spPr>
               <a:xfrm>
                 <a:off x="8174386" y="5804627"/>
-                <a:ext cx="3340658" cy="652551"/>
+                <a:ext cx="3361561" cy="681982"/>
               </a:xfrm>
               <a:prstGeom prst="rect">
                 <a:avLst/>
@@ -28506,7 +28594,7 @@
               <a:blipFill>
                 <a:blip r:embed="rId13"/>
                 <a:stretch>
-                  <a:fillRect l="-1515" t="-1887" b="-13208"/>
+                  <a:fillRect l="-1504" b="-12727"/>
                 </a:stretch>
               </a:blipFill>
             </p:spPr>

</xml_diff>